<commit_message>
Fixed animations for "13. Polymorphism"
</commit_message>
<xml_diff>
--- a/Courses/Software-Sciences/Module-1-OOP-New/13-Polymorphism/13-Polymorphism.pptx
+++ b/Courses/Software-Sciences/Module-1-OOP-New/13-Polymorphism/13-Polymorphism.pptx
@@ -327,7 +327,7 @@
           <a:p>
             <a:fld id="{4E087215-0C8F-4762-A664-737A353EC9A4}" type="datetimeFigureOut">
               <a:rPr lang="bg-BG" smtClean="0"/>
-              <a:t>15.12.22 г.</a:t>
+              <a:t>21.12.22 г.</a:t>
             </a:fld>
             <a:endParaRPr lang="bg-BG"/>
           </a:p>
@@ -420,7 +420,7 @@
               <a:rPr lang="bg-BG" smtClean="0"/>
               <a:t>‹#›</a:t>
             </a:fld>
-            <a:endParaRPr lang="bg-BG" dirty="0"/>
+            <a:endParaRPr lang="bg-BG"/>
           </a:p>
         </p:txBody>
       </p:sp>
@@ -518,7 +518,7 @@
           <a:p>
             <a:fld id="{72D84649-876A-46C9-8472-14CB09C070D8}" type="datetimeFigureOut">
               <a:rPr lang="en-US" smtClean="0"/>
-              <a:t>12/15/22</a:t>
+              <a:t>12/21/22</a:t>
             </a:fld>
             <a:endParaRPr lang="en-US"/>
           </a:p>
@@ -647,7 +647,7 @@
               <a:rPr lang="en-US" smtClean="0"/>
               <a:t>‹#›</a:t>
             </a:fld>
-            <a:endParaRPr lang="en-US" dirty="0"/>
+            <a:endParaRPr lang="en-US"/>
           </a:p>
         </p:txBody>
       </p:sp>
@@ -979,7 +979,7 @@
               <a:tabLst/>
               <a:defRPr/>
             </a:pPr>
-            <a:endParaRPr lang="bg-BG" dirty="0">
+            <a:endParaRPr lang="bg-BG">
               <a:solidFill>
                 <a:schemeClr val="tx1">
                   <a:lumMod val="40000"/>
@@ -1010,7 +1010,7 @@
               <a:pPr/>
               <a:t>17</a:t>
             </a:fld>
-            <a:endParaRPr lang="en-US" dirty="0"/>
+            <a:endParaRPr lang="en-US"/>
           </a:p>
         </p:txBody>
       </p:sp>
@@ -1652,7 +1652,15 @@
             <a:pPr defTabSz="914450"/>
             <a:r>
               <a:rPr lang="en-US" sz="1000" i="1" dirty="0"/>
-              <a:t>(c) 2006 National Academy for Software Development - http://academy.devbg.org*</a:t>
+              <a:t>(c) 2006 National Academy for Software Development - http://</a:t>
+            </a:r>
+            <a:r>
+              <a:rPr lang="en-US" sz="1000" i="1" dirty="0" err="1"/>
+              <a:t>academy.devbg.org</a:t>
+            </a:r>
+            <a:r>
+              <a:rPr lang="en-US" sz="1000" i="1" dirty="0"/>
+              <a:t>*</a:t>
             </a:r>
             <a:endParaRPr lang="en-US" sz="1200" i="1" dirty="0"/>
           </a:p>
@@ -1693,10 +1701,10 @@
               <a:t>26</a:t>
             </a:fld>
             <a:r>
-              <a:rPr lang="en-US" sz="1000" i="1" dirty="0"/>
+              <a:rPr lang="en-US" sz="1000" i="1"/>
               <a:t>##</a:t>
             </a:r>
-            <a:endParaRPr lang="en-US" sz="1200" i="1" dirty="0"/>
+            <a:endParaRPr lang="en-US" sz="1200" i="1"/>
           </a:p>
         </p:txBody>
       </p:sp>
@@ -1803,7 +1811,7 @@
               <a:t>27</a:t>
             </a:fld>
             <a:r>
-              <a:rPr lang="en-US" dirty="0"/>
+              <a:rPr lang="en-US"/>
               <a:t>##</a:t>
             </a:r>
           </a:p>
@@ -1843,7 +1851,7 @@
           <a:lstStyle/>
           <a:p>
             <a:pPr eaLnBrk="1" hangingPunct="1"/>
-            <a:endParaRPr lang="en-US" dirty="0"/>
+            <a:endParaRPr lang="en-US"/>
           </a:p>
         </p:txBody>
       </p:sp>
@@ -1863,7 +1871,7 @@
           <a:lstStyle/>
           <a:p>
             <a:r>
-              <a:rPr lang="en-US" dirty="0"/>
+              <a:rPr lang="en-US"/>
               <a:t>*</a:t>
             </a:r>
           </a:p>
@@ -1885,7 +1893,7 @@
           <a:lstStyle/>
           <a:p>
             <a:r>
-              <a:rPr lang="en-US" dirty="0"/>
+              <a:rPr lang="en-US"/>
               <a:t>07/16/96</a:t>
             </a:r>
           </a:p>
@@ -1921,10 +1929,10 @@
           <a:p>
             <a:pPr defTabSz="914450"/>
             <a:r>
-              <a:rPr lang="en-US" sz="1000" i="1" dirty="0"/>
+              <a:rPr lang="en-US" sz="1000" i="1"/>
               <a:t>(c) 2006 National Academy for Software Development - http://academy.devbg.org*</a:t>
             </a:r>
-            <a:endParaRPr lang="en-US" sz="1200" i="1" dirty="0"/>
+            <a:endParaRPr lang="en-US" sz="1200" i="1"/>
           </a:p>
         </p:txBody>
       </p:sp>
@@ -1963,10 +1971,10 @@
               <a:t>27</a:t>
             </a:fld>
             <a:r>
-              <a:rPr lang="en-US" sz="1000" i="1" dirty="0"/>
+              <a:rPr lang="en-US" sz="1000" i="1"/>
               <a:t>##</a:t>
             </a:r>
-            <a:endParaRPr lang="en-US" sz="1200" i="1" dirty="0"/>
+            <a:endParaRPr lang="en-US" sz="1200" i="1"/>
           </a:p>
         </p:txBody>
       </p:sp>
@@ -2073,7 +2081,7 @@
               <a:t>28</a:t>
             </a:fld>
             <a:r>
-              <a:rPr lang="en-US" dirty="0"/>
+              <a:rPr lang="en-US"/>
               <a:t>##</a:t>
             </a:r>
           </a:p>
@@ -2113,7 +2121,7 @@
           <a:lstStyle/>
           <a:p>
             <a:pPr eaLnBrk="1" hangingPunct="1"/>
-            <a:endParaRPr lang="en-US" dirty="0"/>
+            <a:endParaRPr lang="en-US"/>
           </a:p>
         </p:txBody>
       </p:sp>
@@ -2133,7 +2141,7 @@
           <a:lstStyle/>
           <a:p>
             <a:r>
-              <a:rPr lang="en-US" dirty="0"/>
+              <a:rPr lang="en-US"/>
               <a:t>*</a:t>
             </a:r>
           </a:p>
@@ -2155,7 +2163,7 @@
           <a:lstStyle/>
           <a:p>
             <a:r>
-              <a:rPr lang="en-US" dirty="0"/>
+              <a:rPr lang="en-US"/>
               <a:t>07/16/96</a:t>
             </a:r>
           </a:p>
@@ -2191,10 +2199,10 @@
           <a:p>
             <a:pPr defTabSz="914450"/>
             <a:r>
-              <a:rPr lang="en-US" sz="1000" i="1" dirty="0"/>
+              <a:rPr lang="en-US" sz="1000" i="1"/>
               <a:t>(c) 2006 National Academy for Software Development - http://academy.devbg.org*</a:t>
             </a:r>
-            <a:endParaRPr lang="en-US" sz="1200" i="1" dirty="0"/>
+            <a:endParaRPr lang="en-US" sz="1200" i="1"/>
           </a:p>
         </p:txBody>
       </p:sp>
@@ -2233,10 +2241,10 @@
               <a:t>28</a:t>
             </a:fld>
             <a:r>
-              <a:rPr lang="en-US" sz="1000" i="1" dirty="0"/>
+              <a:rPr lang="en-US" sz="1000" i="1"/>
               <a:t>##</a:t>
             </a:r>
-            <a:endParaRPr lang="en-US" sz="1200" i="1" dirty="0"/>
+            <a:endParaRPr lang="en-US" sz="1200" i="1"/>
           </a:p>
         </p:txBody>
       </p:sp>
@@ -2343,7 +2351,7 @@
               <a:t>29</a:t>
             </a:fld>
             <a:r>
-              <a:rPr lang="en-US" dirty="0"/>
+              <a:rPr lang="en-US"/>
               <a:t>##</a:t>
             </a:r>
           </a:p>
@@ -2383,7 +2391,7 @@
           <a:lstStyle/>
           <a:p>
             <a:pPr eaLnBrk="1" hangingPunct="1"/>
-            <a:endParaRPr lang="en-US" dirty="0"/>
+            <a:endParaRPr lang="en-US"/>
           </a:p>
         </p:txBody>
       </p:sp>
@@ -2403,7 +2411,7 @@
           <a:lstStyle/>
           <a:p>
             <a:r>
-              <a:rPr lang="en-US" dirty="0"/>
+              <a:rPr lang="en-US"/>
               <a:t>*</a:t>
             </a:r>
           </a:p>
@@ -2425,7 +2433,7 @@
           <a:lstStyle/>
           <a:p>
             <a:r>
-              <a:rPr lang="en-US" dirty="0"/>
+              <a:rPr lang="en-US"/>
               <a:t>07/16/96</a:t>
             </a:r>
           </a:p>
@@ -2461,10 +2469,10 @@
           <a:p>
             <a:pPr defTabSz="914450"/>
             <a:r>
-              <a:rPr lang="en-US" sz="1000" i="1" dirty="0"/>
+              <a:rPr lang="en-US" sz="1000" i="1"/>
               <a:t>(c) 2006 National Academy for Software Development - http://academy.devbg.org*</a:t>
             </a:r>
-            <a:endParaRPr lang="en-US" sz="1200" i="1" dirty="0"/>
+            <a:endParaRPr lang="en-US" sz="1200" i="1"/>
           </a:p>
         </p:txBody>
       </p:sp>
@@ -2503,10 +2511,10 @@
               <a:t>29</a:t>
             </a:fld>
             <a:r>
-              <a:rPr lang="en-US" sz="1000" i="1" dirty="0"/>
+              <a:rPr lang="en-US" sz="1000" i="1"/>
               <a:t>##</a:t>
             </a:r>
-            <a:endParaRPr lang="en-US" sz="1200" i="1" dirty="0"/>
+            <a:endParaRPr lang="en-US" sz="1200" i="1"/>
           </a:p>
         </p:txBody>
       </p:sp>
@@ -2636,7 +2644,7 @@
               <a:tabLst/>
               <a:defRPr/>
             </a:pPr>
-            <a:endParaRPr lang="bg-BG" dirty="0">
+            <a:endParaRPr lang="bg-BG">
               <a:solidFill>
                 <a:schemeClr val="tx1">
                   <a:lumMod val="40000"/>
@@ -2667,7 +2675,7 @@
               <a:pPr/>
               <a:t>31</a:t>
             </a:fld>
-            <a:endParaRPr lang="en-US" dirty="0"/>
+            <a:endParaRPr lang="en-US"/>
           </a:p>
         </p:txBody>
       </p:sp>
@@ -2797,7 +2805,7 @@
               <a:tabLst/>
               <a:defRPr/>
             </a:pPr>
-            <a:endParaRPr lang="bg-BG" dirty="0">
+            <a:endParaRPr lang="bg-BG">
               <a:solidFill>
                 <a:schemeClr val="tx1">
                   <a:lumMod val="40000"/>
@@ -2828,7 +2836,7 @@
               <a:pPr/>
               <a:t>32</a:t>
             </a:fld>
-            <a:endParaRPr lang="en-US" dirty="0"/>
+            <a:endParaRPr lang="en-US"/>
           </a:p>
         </p:txBody>
       </p:sp>
@@ -2939,7 +2947,7 @@
           <a:bodyPr/>
           <a:lstStyle/>
           <a:p>
-            <a:endParaRPr lang="en-US" dirty="0"/>
+            <a:endParaRPr lang="en-US"/>
           </a:p>
         </p:txBody>
       </p:sp>
@@ -3009,7 +3017,7 @@
               </a:pPr>
               <a:t>33</a:t>
             </a:fld>
-            <a:endParaRPr kumimoji="0" lang="en-US" sz="1200" b="0" i="0" u="none" strike="noStrike" kern="1200" cap="none" spc="0" normalizeH="0" baseline="0" noProof="0" dirty="0">
+            <a:endParaRPr kumimoji="0" lang="en-US" sz="1200" b="0" i="0" u="none" strike="noStrike" kern="1200" cap="none" spc="0" normalizeH="0" baseline="0" noProof="0">
               <a:ln>
                 <a:noFill/>
               </a:ln>
@@ -3429,7 +3437,7 @@
               <a:pPr/>
               <a:t>34</a:t>
             </a:fld>
-            <a:endParaRPr lang="en-US" dirty="0"/>
+            <a:endParaRPr lang="en-US"/>
           </a:p>
         </p:txBody>
       </p:sp>
@@ -3670,7 +3678,7 @@
               <a:pPr/>
               <a:t>35</a:t>
             </a:fld>
-            <a:endParaRPr lang="en-US" dirty="0"/>
+            <a:endParaRPr lang="en-US"/>
           </a:p>
         </p:txBody>
       </p:sp>
@@ -4187,7 +4195,7 @@
           <a:bodyPr/>
           <a:lstStyle/>
           <a:p>
-            <a:endParaRPr lang="en-BG" dirty="0"/>
+            <a:endParaRPr lang="en-BG"/>
           </a:p>
         </p:txBody>
       </p:sp>
@@ -4230,20 +4238,19 @@
           <a:lstStyle/>
           <a:p>
             <a:r>
-              <a:rPr lang="en-US"/>
+              <a:rPr lang="en-US" dirty="0"/>
               <a:t>© SoftUni – </a:t>
             </a:r>
             <a:r>
-              <a:rPr lang="en-US" u="sng">
+              <a:rPr lang="en-US" u="sng" dirty="0">
                 <a:hlinkClick r:id="rId3"/>
               </a:rPr>
               <a:t>https://softuni.org</a:t>
             </a:r>
             <a:r>
-              <a:rPr lang="en-US"/>
+              <a:rPr lang="en-US" dirty="0"/>
               <a:t>. Copyrighted document. Unauthorized copy or reproduction is not permitted.</a:t>
             </a:r>
-            <a:endParaRPr lang="en-US" dirty="0"/>
           </a:p>
         </p:txBody>
       </p:sp>
@@ -4556,9 +4563,17 @@
             <a:pPr defTabSz="914450"/>
             <a:r>
               <a:rPr lang="en-US" sz="1000" i="1" dirty="0"/>
-              <a:t>(c) 2006 National Academy for Software Development - http://academy.devbg.org*</a:t>
-            </a:r>
-            <a:endParaRPr lang="en-US" sz="1200" i="1" dirty="0"/>
+              <a:t>(c) 2006 National Academy for Software Development - http://</a:t>
+            </a:r>
+            <a:r>
+              <a:rPr lang="en-US" sz="1000" i="1" dirty="0" err="1"/>
+              <a:t>academy.devbg.org</a:t>
+            </a:r>
+            <a:r>
+              <a:rPr lang="en-US" sz="1000" i="1"/>
+              <a:t>*</a:t>
+            </a:r>
+            <a:endParaRPr lang="en-US" sz="1200" i="1"/>
           </a:p>
         </p:txBody>
       </p:sp>
@@ -4597,10 +4612,10 @@
               <a:t>15</a:t>
             </a:fld>
             <a:r>
-              <a:rPr lang="en-US" sz="1000" i="1" dirty="0"/>
+              <a:rPr lang="en-US" sz="1000" i="1"/>
               <a:t>##</a:t>
             </a:r>
-            <a:endParaRPr lang="en-US" sz="1200" i="1" dirty="0"/>
+            <a:endParaRPr lang="en-US" sz="1200" i="1"/>
           </a:p>
         </p:txBody>
       </p:sp>
@@ -4707,7 +4722,7 @@
               <a:t>16</a:t>
             </a:fld>
             <a:r>
-              <a:rPr lang="en-US" dirty="0"/>
+              <a:rPr lang="en-US"/>
               <a:t>##</a:t>
             </a:r>
           </a:p>
@@ -4747,7 +4762,7 @@
           <a:lstStyle/>
           <a:p>
             <a:pPr eaLnBrk="1" hangingPunct="1"/>
-            <a:endParaRPr lang="en-US" dirty="0"/>
+            <a:endParaRPr lang="en-US"/>
           </a:p>
         </p:txBody>
       </p:sp>
@@ -4767,7 +4782,7 @@
           <a:lstStyle/>
           <a:p>
             <a:r>
-              <a:rPr lang="en-US" dirty="0"/>
+              <a:rPr lang="en-US"/>
               <a:t>*</a:t>
             </a:r>
           </a:p>
@@ -4789,7 +4804,7 @@
           <a:lstStyle/>
           <a:p>
             <a:r>
-              <a:rPr lang="en-US" dirty="0"/>
+              <a:rPr lang="en-US"/>
               <a:t>07/16/96</a:t>
             </a:r>
           </a:p>
@@ -4825,10 +4840,10 @@
           <a:p>
             <a:pPr defTabSz="914450"/>
             <a:r>
-              <a:rPr lang="en-US" sz="1000" i="1" dirty="0"/>
+              <a:rPr lang="en-US" sz="1000" i="1"/>
               <a:t>(c) 2006 National Academy for Software Development - http://academy.devbg.org*</a:t>
             </a:r>
-            <a:endParaRPr lang="en-US" sz="1200" i="1" dirty="0"/>
+            <a:endParaRPr lang="en-US" sz="1200" i="1"/>
           </a:p>
         </p:txBody>
       </p:sp>
@@ -4867,10 +4882,10 @@
               <a:t>16</a:t>
             </a:fld>
             <a:r>
-              <a:rPr lang="en-US" sz="1000" i="1" dirty="0"/>
+              <a:rPr lang="en-US" sz="1000" i="1"/>
               <a:t>##</a:t>
             </a:r>
-            <a:endParaRPr lang="en-US" sz="1200" i="1" dirty="0"/>
+            <a:endParaRPr lang="en-US" sz="1200" i="1"/>
           </a:p>
         </p:txBody>
       </p:sp>
@@ -5443,7 +5458,7 @@
           </a:lstStyle>
           <a:p>
             <a:r>
-              <a:rPr lang="en-US" noProof="0" dirty="0"/>
+              <a:rPr lang="en-US" noProof="0"/>
               <a:t>Click icon to add picture</a:t>
             </a:r>
           </a:p>
@@ -5706,7 +5721,7 @@
               <a:pPr/>
               <a:t>‹#›</a:t>
             </a:fld>
-            <a:endParaRPr lang="en-US" dirty="0"/>
+            <a:endParaRPr lang="en-US"/>
           </a:p>
         </p:txBody>
       </p:sp>
@@ -7850,7 +7865,7 @@
               <a:pPr/>
               <a:t>‹#›</a:t>
             </a:fld>
-            <a:endParaRPr lang="en-US" noProof="0" dirty="0"/>
+            <a:endParaRPr lang="en-US" noProof="0"/>
           </a:p>
         </p:txBody>
       </p:sp>
@@ -8202,7 +8217,7 @@
               <a:tabLst/>
               <a:defRPr/>
             </a:pPr>
-            <a:endParaRPr kumimoji="0" lang="en-US" altLang="ko-KR" sz="2398" b="0" i="0" u="none" strike="noStrike" kern="1200" cap="none" spc="0" normalizeH="0" baseline="0" noProof="0" dirty="0">
+            <a:endParaRPr kumimoji="0" lang="en-US" altLang="ko-KR" sz="2398" b="0" i="0" u="none" strike="noStrike" kern="1200" cap="none" spc="0" normalizeH="0" baseline="0" noProof="0">
               <a:ln>
                 <a:noFill/>
               </a:ln>
@@ -8576,7 +8591,7 @@
               <a:pPr/>
               <a:t>‹#›</a:t>
             </a:fld>
-            <a:endParaRPr lang="en-US" noProof="0" dirty="0"/>
+            <a:endParaRPr lang="en-US" noProof="0"/>
           </a:p>
         </p:txBody>
       </p:sp>
@@ -9257,7 +9272,7 @@
               <a:pPr/>
               <a:t>‹#›</a:t>
             </a:fld>
-            <a:endParaRPr lang="en-US" noProof="0" dirty="0"/>
+            <a:endParaRPr lang="en-US" noProof="0"/>
           </a:p>
         </p:txBody>
       </p:sp>
@@ -9319,7 +9334,7 @@
               <a:tabLst/>
               <a:defRPr/>
             </a:pPr>
-            <a:endParaRPr kumimoji="0" lang="en-US" altLang="ko-KR" sz="2398" b="0" i="0" u="none" strike="noStrike" kern="1200" cap="none" spc="0" normalizeH="0" baseline="0" noProof="0" dirty="0">
+            <a:endParaRPr kumimoji="0" lang="en-US" altLang="ko-KR" sz="2398" b="0" i="0" u="none" strike="noStrike" kern="1200" cap="none" spc="0" normalizeH="0" baseline="0" noProof="0">
               <a:ln>
                 <a:noFill/>
               </a:ln>
@@ -9632,7 +9647,7 @@
               <a:pPr/>
               <a:t>‹#›</a:t>
             </a:fld>
-            <a:endParaRPr lang="en-US" noProof="0" dirty="0"/>
+            <a:endParaRPr lang="en-US" noProof="0"/>
           </a:p>
         </p:txBody>
       </p:sp>
@@ -9700,7 +9715,7 @@
               <a:tabLst/>
               <a:defRPr/>
             </a:pPr>
-            <a:endParaRPr kumimoji="0" lang="en-US" altLang="ko-KR" sz="2398" b="0" i="0" u="none" strike="noStrike" kern="1200" cap="none" spc="0" normalizeH="0" baseline="0" noProof="0" dirty="0">
+            <a:endParaRPr kumimoji="0" lang="en-US" altLang="ko-KR" sz="2398" b="0" i="0" u="none" strike="noStrike" kern="1200" cap="none" spc="0" normalizeH="0" baseline="0" noProof="0">
               <a:ln>
                 <a:noFill/>
               </a:ln>
@@ -10013,7 +10028,7 @@
               <a:pPr/>
               <a:t>‹#›</a:t>
             </a:fld>
-            <a:endParaRPr lang="en-US" noProof="0" dirty="0"/>
+            <a:endParaRPr lang="en-US" noProof="0"/>
           </a:p>
         </p:txBody>
       </p:sp>
@@ -10081,7 +10096,7 @@
               <a:tabLst/>
               <a:defRPr/>
             </a:pPr>
-            <a:endParaRPr kumimoji="0" lang="en-US" altLang="ko-KR" sz="2398" b="0" i="0" u="none" strike="noStrike" kern="1200" cap="none" spc="0" normalizeH="0" baseline="0" noProof="0" dirty="0">
+            <a:endParaRPr kumimoji="0" lang="en-US" altLang="ko-KR" sz="2398" b="0" i="0" u="none" strike="noStrike" kern="1200" cap="none" spc="0" normalizeH="0" baseline="0" noProof="0">
               <a:ln>
                 <a:noFill/>
               </a:ln>
@@ -11436,7 +11451,7 @@
           <a:lstStyle/>
           <a:p>
             <a:r>
-              <a:rPr lang="en-US">
+              <a:rPr lang="en-US" dirty="0">
                 <a:hlinkClick r:id="rId3"/>
               </a:rPr>
               <a:t>https://softuni.bg</a:t>
@@ -11461,10 +11476,9 @@
           <a:lstStyle/>
           <a:p>
             <a:r>
-              <a:rPr lang="en-US"/>
+              <a:rPr lang="en-US" dirty="0"/>
               <a:t>Software University</a:t>
             </a:r>
-            <a:endParaRPr lang="en-US" dirty="0"/>
           </a:p>
         </p:txBody>
       </p:sp>
@@ -11926,7 +11940,27 @@
                 <a:latin typeface="Consolas" pitchFamily="49" charset="0"/>
                 <a:cs typeface="Consolas" pitchFamily="49" charset="0"/>
               </a:rPr>
-              <a:t>// Do something specific for Person</a:t>
+              <a:t>// </a:t>
+            </a:r>
+            <a:r>
+              <a:rPr lang="bg-BG" sz="2800" b="1" i="1" noProof="1">
+                <a:solidFill>
+                  <a:schemeClr val="accent2"/>
+                </a:solidFill>
+                <a:latin typeface="Consolas" pitchFamily="49" charset="0"/>
+                <a:cs typeface="Consolas" pitchFamily="49" charset="0"/>
+              </a:rPr>
+              <a:t>Специфични действия за </a:t>
+            </a:r>
+            <a:r>
+              <a:rPr lang="en-US" sz="2800" b="1" i="1" noProof="1">
+                <a:solidFill>
+                  <a:schemeClr val="accent2"/>
+                </a:solidFill>
+                <a:latin typeface="Consolas" pitchFamily="49" charset="0"/>
+                <a:cs typeface="Consolas" pitchFamily="49" charset="0"/>
+              </a:rPr>
+              <a:t>Person</a:t>
             </a:r>
           </a:p>
           <a:p>
@@ -12025,7 +12059,7 @@
         </p:nvSpPr>
         <p:spPr bwMode="auto">
           <a:xfrm>
-            <a:off x="6771000" y="3606030"/>
+            <a:off x="7456217" y="3563343"/>
             <a:ext cx="4230000" cy="670357"/>
           </a:xfrm>
           <a:prstGeom prst="wedgeRoundRectCallout">
@@ -12086,10 +12120,21 @@
             <a:r>
               <a:rPr lang="en-US" sz="2400" b="1" dirty="0">
                 <a:solidFill>
+                  <a:schemeClr val="bg1">
+                    <a:lumMod val="60000"/>
+                    <a:lumOff val="40000"/>
+                  </a:schemeClr>
+                </a:solidFill>
+              </a:rPr>
+              <a:t>Mammal</a:t>
+            </a:r>
+            <a:r>
+              <a:rPr lang="en-US" sz="2400" b="1" dirty="0">
+                <a:solidFill>
                   <a:schemeClr val="bg2"/>
                 </a:solidFill>
               </a:rPr>
-              <a:t>Mammal </a:t>
+              <a:t> </a:t>
             </a:r>
             <a:r>
               <a:rPr lang="bg-BG" sz="2400" b="1" dirty="0">
@@ -12105,11 +12150,25 @@
                   <a:schemeClr val="bg2"/>
                 </a:solidFill>
               </a:rPr>
-              <a:t> Person</a:t>
+              <a:t> </a:t>
+            </a:r>
+            <a:r>
+              <a:rPr lang="en-US" sz="2400" b="1" dirty="0">
+                <a:solidFill>
+                  <a:schemeClr val="bg1">
+                    <a:lumMod val="60000"/>
+                    <a:lumOff val="40000"/>
+                  </a:schemeClr>
+                </a:solidFill>
+              </a:rPr>
+              <a:t>Person</a:t>
             </a:r>
             <a:endParaRPr lang="bg-BG" sz="2400" b="1" dirty="0">
               <a:solidFill>
-                <a:schemeClr val="bg2"/>
+                <a:schemeClr val="bg1">
+                  <a:lumMod val="60000"/>
+                  <a:lumOff val="40000"/>
+                </a:schemeClr>
               </a:solidFill>
             </a:endParaRPr>
           </a:p>
@@ -15442,11 +15501,11 @@
               <a:defRPr/>
             </a:pPr>
             <a:r>
-              <a:rPr lang="bg-BG" sz="4000" dirty="0"/>
+              <a:rPr lang="bg-BG" sz="4000"/>
               <a:t>Решение</a:t>
             </a:r>
             <a:r>
-              <a:rPr lang="en-US" sz="4000" dirty="0"/>
+              <a:rPr lang="en-US" sz="4000"/>
               <a:t>: </a:t>
             </a:r>
             <a:r>
@@ -15509,7 +15568,7 @@
           </a:lstStyle>
           <a:p>
             <a:r>
-              <a:rPr lang="en-US" sz="2800" dirty="0">
+              <a:rPr lang="en-US" sz="2800">
                 <a:solidFill>
                   <a:schemeClr val="tx1"/>
                 </a:solidFill>
@@ -15519,7 +15578,7 @@
           </a:p>
           <a:p>
             <a:r>
-              <a:rPr lang="en-US" sz="2800" dirty="0">
+              <a:rPr lang="en-US" sz="2800">
                 <a:solidFill>
                   <a:schemeClr val="tx1"/>
                 </a:solidFill>
@@ -15529,7 +15588,7 @@
           </a:p>
           <a:p>
             <a:r>
-              <a:rPr lang="en-US" sz="2800" dirty="0">
+              <a:rPr lang="en-US" sz="2800">
                 <a:solidFill>
                   <a:schemeClr val="tx1"/>
                 </a:solidFill>
@@ -15539,7 +15598,7 @@
           </a:p>
           <a:p>
             <a:r>
-              <a:rPr lang="en-US" sz="2800" dirty="0">
+              <a:rPr lang="en-US" sz="2800">
                 <a:solidFill>
                   <a:schemeClr val="tx1"/>
                 </a:solidFill>
@@ -15549,7 +15608,7 @@
           </a:p>
           <a:p>
             <a:r>
-              <a:rPr lang="en-US" sz="2800" dirty="0">
+              <a:rPr lang="en-US" sz="2800">
                 <a:solidFill>
                   <a:schemeClr val="tx1"/>
                 </a:solidFill>
@@ -15559,7 +15618,7 @@
           </a:p>
           <a:p>
             <a:r>
-              <a:rPr lang="en-US" sz="2800" dirty="0">
+              <a:rPr lang="en-US" sz="2800">
                 <a:solidFill>
                   <a:schemeClr val="tx1"/>
                 </a:solidFill>
@@ -15569,7 +15628,7 @@
           </a:p>
           <a:p>
             <a:r>
-              <a:rPr lang="en-US" sz="2800" dirty="0">
+              <a:rPr lang="en-US" sz="2800">
                 <a:solidFill>
                   <a:schemeClr val="tx1"/>
                 </a:solidFill>
@@ -15579,7 +15638,7 @@
           </a:p>
           <a:p>
             <a:r>
-              <a:rPr lang="en-US" sz="2800" dirty="0">
+              <a:rPr lang="en-US" sz="2800">
                 <a:solidFill>
                   <a:schemeClr val="tx1"/>
                 </a:solidFill>
@@ -15589,7 +15648,7 @@
           </a:p>
           <a:p>
             <a:r>
-              <a:rPr lang="en-US" sz="2800" dirty="0">
+              <a:rPr lang="en-US" sz="2800">
                 <a:solidFill>
                   <a:schemeClr val="tx1"/>
                 </a:solidFill>
@@ -15599,7 +15658,7 @@
           </a:p>
           <a:p>
             <a:r>
-              <a:rPr lang="en-US" sz="2800" dirty="0">
+              <a:rPr lang="en-US" sz="2800">
                 <a:solidFill>
                   <a:schemeClr val="tx1"/>
                 </a:solidFill>
@@ -15609,7 +15668,7 @@
           </a:p>
           <a:p>
             <a:r>
-              <a:rPr lang="en-US" sz="2800" dirty="0">
+              <a:rPr lang="en-US" sz="2800">
                 <a:solidFill>
                   <a:schemeClr val="tx1"/>
                 </a:solidFill>
@@ -15619,7 +15678,7 @@
           </a:p>
           <a:p>
             <a:r>
-              <a:rPr lang="en-US" sz="2800" dirty="0">
+              <a:rPr lang="en-US" sz="2800">
                 <a:solidFill>
                   <a:schemeClr val="tx1"/>
                 </a:solidFill>
@@ -15667,7 +15726,7 @@
               <a:pPr/>
               <a:t>16</a:t>
             </a:fld>
-            <a:endParaRPr lang="en-US" noProof="0" dirty="0"/>
+            <a:endParaRPr lang="en-US" noProof="0"/>
           </a:p>
         </p:txBody>
       </p:sp>
@@ -16106,15 +16165,15 @@
               </a:buClr>
             </a:pPr>
             <a:r>
-              <a:rPr lang="bg-BG" dirty="0"/>
+              <a:rPr lang="bg-BG"/>
               <a:t>Сигнатурите</a:t>
             </a:r>
             <a:r>
-              <a:rPr lang="en-US" dirty="0"/>
+              <a:rPr lang="en-US"/>
               <a:t> </a:t>
             </a:r>
             <a:r>
-              <a:rPr lang="bg-BG" b="1" dirty="0">
+              <a:rPr lang="bg-BG" b="1">
                 <a:solidFill>
                   <a:schemeClr val="bg1"/>
                 </a:solidFill>
@@ -16122,15 +16181,15 @@
               <a:t>трябва да се различават</a:t>
             </a:r>
             <a:r>
-              <a:rPr lang="en-US" dirty="0"/>
+              <a:rPr lang="en-US"/>
               <a:t> </a:t>
             </a:r>
             <a:r>
-              <a:rPr lang="bg-BG" dirty="0"/>
+              <a:rPr lang="bg-BG"/>
               <a:t>по един от следните показатели</a:t>
             </a:r>
             <a:r>
-              <a:rPr lang="en-US" dirty="0"/>
+              <a:rPr lang="en-US"/>
               <a:t>: </a:t>
             </a:r>
           </a:p>
@@ -16141,7 +16200,7 @@
               </a:buClr>
             </a:pPr>
             <a:r>
-              <a:rPr lang="bg-BG" b="1" dirty="0">
+              <a:rPr lang="bg-BG" b="1">
                 <a:solidFill>
                   <a:schemeClr val="bg1"/>
                 </a:solidFill>
@@ -16149,7 +16208,7 @@
               <a:t>Броя</a:t>
             </a:r>
             <a:r>
-              <a:rPr lang="en-US" b="1" dirty="0">
+              <a:rPr lang="en-US" b="1">
                 <a:solidFill>
                   <a:schemeClr val="bg1"/>
                 </a:solidFill>
@@ -16157,10 +16216,10 @@
               <a:t> </a:t>
             </a:r>
             <a:r>
-              <a:rPr lang="bg-BG" dirty="0"/>
+              <a:rPr lang="bg-BG"/>
               <a:t>на аргументите</a:t>
             </a:r>
-            <a:endParaRPr lang="en-US" dirty="0"/>
+            <a:endParaRPr lang="en-US"/>
           </a:p>
           <a:p>
             <a:pPr lvl="1">
@@ -16169,7 +16228,7 @@
               </a:buClr>
             </a:pPr>
             <a:r>
-              <a:rPr lang="bg-BG" b="1" dirty="0">
+              <a:rPr lang="bg-BG" b="1">
                 <a:solidFill>
                   <a:schemeClr val="bg1"/>
                 </a:solidFill>
@@ -16177,7 +16236,7 @@
               <a:t>Типа</a:t>
             </a:r>
             <a:r>
-              <a:rPr lang="en-US" b="1" dirty="0">
+              <a:rPr lang="en-US" b="1">
                 <a:solidFill>
                   <a:schemeClr val="bg1"/>
                 </a:solidFill>
@@ -16185,10 +16244,10 @@
               <a:t> </a:t>
             </a:r>
             <a:r>
-              <a:rPr lang="bg-BG" dirty="0"/>
+              <a:rPr lang="bg-BG"/>
               <a:t>на аргументите</a:t>
             </a:r>
-            <a:endParaRPr lang="en-US" dirty="0"/>
+            <a:endParaRPr lang="en-US"/>
           </a:p>
           <a:p>
             <a:pPr lvl="1">
@@ -16197,7 +16256,7 @@
               </a:buClr>
             </a:pPr>
             <a:r>
-              <a:rPr lang="bg-BG" b="1" dirty="0">
+              <a:rPr lang="bg-BG" b="1">
                 <a:solidFill>
                   <a:schemeClr val="bg1"/>
                 </a:solidFill>
@@ -16205,7 +16264,7 @@
               <a:t>Реда</a:t>
             </a:r>
             <a:r>
-              <a:rPr lang="en-US" b="1" dirty="0">
+              <a:rPr lang="en-US" b="1">
                 <a:solidFill>
                   <a:schemeClr val="bg1"/>
                 </a:solidFill>
@@ -16213,10 +16272,10 @@
               <a:t> </a:t>
             </a:r>
             <a:r>
-              <a:rPr lang="bg-BG" dirty="0"/>
+              <a:rPr lang="bg-BG"/>
               <a:t>на аргументите</a:t>
             </a:r>
-            <a:endParaRPr lang="en-US" dirty="0"/>
+            <a:endParaRPr lang="en-US"/>
           </a:p>
           <a:p>
             <a:pPr>
@@ -16225,11 +16284,11 @@
               </a:buClr>
             </a:pPr>
             <a:r>
-              <a:rPr lang="bg-BG" dirty="0"/>
+              <a:rPr lang="bg-BG"/>
               <a:t>Типът на върнатата стойност </a:t>
             </a:r>
             <a:r>
-              <a:rPr lang="bg-BG" b="1" dirty="0">
+              <a:rPr lang="bg-BG" b="1">
                 <a:solidFill>
                   <a:schemeClr val="bg1"/>
                 </a:solidFill>
@@ -16237,10 +16296,10 @@
               <a:t>не е </a:t>
             </a:r>
             <a:r>
-              <a:rPr lang="bg-BG" dirty="0"/>
+              <a:rPr lang="bg-BG"/>
               <a:t>част от сигнатурата</a:t>
             </a:r>
-            <a:endParaRPr lang="en-US" dirty="0"/>
+            <a:endParaRPr lang="en-US"/>
           </a:p>
           <a:p>
             <a:pPr>
@@ -16249,23 +16308,23 @@
               </a:buClr>
             </a:pPr>
             <a:r>
-              <a:rPr lang="bg-BG" dirty="0"/>
+              <a:rPr lang="bg-BG"/>
               <a:t>Процесът на </a:t>
             </a:r>
             <a:r>
-              <a:rPr lang="en-US" dirty="0"/>
+              <a:rPr lang="en-US"/>
               <a:t>overloading </a:t>
             </a:r>
             <a:r>
-              <a:rPr lang="bg-BG" dirty="0"/>
+              <a:rPr lang="bg-BG"/>
               <a:t>може да се осъществи в</a:t>
             </a:r>
             <a:r>
-              <a:rPr lang="en-US" dirty="0"/>
+              <a:rPr lang="en-US"/>
               <a:t> </a:t>
             </a:r>
             <a:r>
-              <a:rPr lang="bg-BG" b="1" dirty="0">
+              <a:rPr lang="bg-BG" b="1">
                 <a:solidFill>
                   <a:schemeClr val="bg1"/>
                 </a:solidFill>
@@ -16273,18 +16332,18 @@
               <a:t>един и същ клас </a:t>
             </a:r>
             <a:r>
-              <a:rPr lang="bg-BG" dirty="0"/>
+              <a:rPr lang="bg-BG"/>
               <a:t>или в неговите </a:t>
             </a:r>
             <a:r>
-              <a:rPr lang="bg-BG" b="1" dirty="0">
+              <a:rPr lang="bg-BG" b="1">
                 <a:solidFill>
                   <a:schemeClr val="bg1"/>
                 </a:solidFill>
               </a:rPr>
               <a:t>подкласове</a:t>
             </a:r>
-            <a:endParaRPr lang="en-US" b="1" dirty="0">
+            <a:endParaRPr lang="en-US" b="1">
               <a:solidFill>
                 <a:schemeClr val="bg1"/>
               </a:solidFill>
@@ -16297,18 +16356,18 @@
               </a:buClr>
             </a:pPr>
             <a:r>
-              <a:rPr lang="bg-BG" dirty="0"/>
+              <a:rPr lang="bg-BG"/>
               <a:t>Конструкторите също могат да имат </a:t>
             </a:r>
             <a:r>
-              <a:rPr lang="bg-BG" b="1" dirty="0">
+              <a:rPr lang="bg-BG" b="1">
                 <a:solidFill>
                   <a:schemeClr val="bg1"/>
                 </a:solidFill>
               </a:rPr>
               <a:t>различни варианти</a:t>
             </a:r>
-            <a:endParaRPr lang="en-US" b="1" dirty="0">
+            <a:endParaRPr lang="en-US" b="1">
               <a:solidFill>
                 <a:schemeClr val="bg1"/>
               </a:solidFill>
@@ -16347,7 +16406,7 @@
               <a:rPr lang="en-US" noProof="1"/>
               <a:t>(1)</a:t>
             </a:r>
-            <a:endParaRPr lang="en-US" dirty="0"/>
+            <a:endParaRPr lang="en-US"/>
           </a:p>
         </p:txBody>
       </p:sp>
@@ -16389,7 +16448,7 @@
               <a:pPr/>
               <a:t>17</a:t>
             </a:fld>
-            <a:endParaRPr lang="en-US" noProof="0" dirty="0"/>
+            <a:endParaRPr lang="en-US" noProof="0"/>
           </a:p>
         </p:txBody>
       </p:sp>
@@ -16730,7 +16789,7 @@
               </a:buClr>
             </a:pPr>
             <a:r>
-              <a:rPr lang="bg-BG" b="1" dirty="0">
+              <a:rPr lang="bg-BG" b="1">
                 <a:solidFill>
                   <a:schemeClr val="bg1"/>
                 </a:solidFill>
@@ -16738,13 +16797,13 @@
               <a:t>Различен брой </a:t>
             </a:r>
             <a:r>
-              <a:rPr lang="bg-BG" dirty="0"/>
+              <a:rPr lang="bg-BG"/>
               <a:t>на аргументите</a:t>
             </a:r>
-            <a:endParaRPr lang="en-US" dirty="0"/>
-          </a:p>
-          <a:p>
-            <a:endParaRPr lang="en-US" dirty="0"/>
+            <a:endParaRPr lang="en-US"/>
+          </a:p>
+          <a:p>
+            <a:endParaRPr lang="en-US"/>
           </a:p>
         </p:txBody>
       </p:sp>
@@ -16786,7 +16845,7 @@
               <a:rPr lang="en-US" noProof="1"/>
               <a:t>(1)</a:t>
             </a:r>
-            <a:endParaRPr lang="en-US" dirty="0"/>
+            <a:endParaRPr lang="en-US"/>
           </a:p>
         </p:txBody>
       </p:sp>
@@ -17464,7 +17523,7 @@
               <a:pPr/>
               <a:t>18</a:t>
             </a:fld>
-            <a:endParaRPr lang="en-US" noProof="0" dirty="0"/>
+            <a:endParaRPr lang="en-US" noProof="0"/>
           </a:p>
         </p:txBody>
       </p:sp>
@@ -17610,7 +17669,7 @@
               <a:pPr/>
               <a:t>19</a:t>
             </a:fld>
-            <a:endParaRPr lang="en-US" noProof="0" dirty="0"/>
+            <a:endParaRPr lang="en-US" noProof="0"/>
           </a:p>
         </p:txBody>
       </p:sp>
@@ -17641,7 +17700,7 @@
               </a:buClr>
             </a:pPr>
             <a:r>
-              <a:rPr lang="bg-BG" b="1" dirty="0">
+              <a:rPr lang="bg-BG" b="1">
                 <a:solidFill>
                   <a:schemeClr val="bg1"/>
                 </a:solidFill>
@@ -17649,13 +17708,13 @@
               <a:t>Различен тип </a:t>
             </a:r>
             <a:r>
-              <a:rPr lang="bg-BG" dirty="0"/>
+              <a:rPr lang="bg-BG"/>
               <a:t>на аргументите</a:t>
             </a:r>
-            <a:endParaRPr lang="en-US" dirty="0"/>
-          </a:p>
-          <a:p>
-            <a:endParaRPr lang="en-BG" dirty="0"/>
+            <a:endParaRPr lang="en-US"/>
+          </a:p>
+          <a:p>
+            <a:endParaRPr lang="en-BG"/>
           </a:p>
         </p:txBody>
       </p:sp>
@@ -17704,7 +17763,7 @@
               <a:rPr lang="en-US" noProof="1"/>
               <a:t>)</a:t>
             </a:r>
-            <a:endParaRPr lang="en-BG" dirty="0"/>
+            <a:endParaRPr lang="en-BG"/>
           </a:p>
         </p:txBody>
       </p:sp>
@@ -18517,7 +18576,7 @@
             </a:r>
             <a:r>
               <a:rPr lang="bg-BG" dirty="0"/>
-              <a:t>презареждане на методи (</a:t>
+              <a:t>варианти на методи (</a:t>
             </a:r>
             <a:r>
               <a:rPr lang="en-US" dirty="0"/>
@@ -18898,7 +18957,7 @@
               </a:buClr>
             </a:pPr>
             <a:r>
-              <a:rPr lang="bg-BG" b="1" dirty="0">
+              <a:rPr lang="bg-BG" b="1">
                 <a:solidFill>
                   <a:schemeClr val="bg1"/>
                 </a:solidFill>
@@ -18906,7 +18965,7 @@
               <a:t>Различен</a:t>
             </a:r>
             <a:r>
-              <a:rPr lang="en-US" b="1" dirty="0">
+              <a:rPr lang="en-US" b="1">
                 <a:solidFill>
                   <a:schemeClr val="bg1"/>
                 </a:solidFill>
@@ -18914,7 +18973,7 @@
               <a:t> </a:t>
             </a:r>
             <a:r>
-              <a:rPr lang="bg-BG" b="1" dirty="0">
+              <a:rPr lang="bg-BG" b="1">
                 <a:solidFill>
                   <a:schemeClr val="bg1"/>
                 </a:solidFill>
@@ -18922,7 +18981,7 @@
               <a:t>ред</a:t>
             </a:r>
             <a:r>
-              <a:rPr lang="en-US" b="1" dirty="0">
+              <a:rPr lang="en-US" b="1">
                 <a:solidFill>
                   <a:schemeClr val="bg1"/>
                 </a:solidFill>
@@ -18930,13 +18989,13 @@
               <a:t> </a:t>
             </a:r>
             <a:r>
-              <a:rPr lang="bg-BG" dirty="0"/>
+              <a:rPr lang="bg-BG"/>
               <a:t>на аргументите</a:t>
             </a:r>
-            <a:endParaRPr lang="en-US" dirty="0"/>
-          </a:p>
-          <a:p>
-            <a:endParaRPr lang="en-US" dirty="0"/>
+            <a:endParaRPr lang="en-US"/>
+          </a:p>
+          <a:p>
+            <a:endParaRPr lang="en-US"/>
           </a:p>
         </p:txBody>
       </p:sp>
@@ -18971,7 +19030,7 @@
               <a:rPr lang="en-US" noProof="1"/>
               <a:t>(3)</a:t>
             </a:r>
-            <a:endParaRPr lang="en-US" dirty="0"/>
+            <a:endParaRPr lang="en-US"/>
           </a:p>
         </p:txBody>
       </p:sp>
@@ -19432,7 +19491,7 @@
               <a:pPr/>
               <a:t>20</a:t>
             </a:fld>
-            <a:endParaRPr lang="en-US" noProof="0" dirty="0"/>
+            <a:endParaRPr lang="en-US" noProof="0"/>
           </a:p>
         </p:txBody>
       </p:sp>
@@ -19659,18 +19718,18 @@
           <a:lstStyle/>
           <a:p>
             <a:r>
-              <a:rPr lang="bg-BG" sz="3400" dirty="0"/>
+              <a:rPr lang="bg-BG" sz="3400"/>
               <a:t>Една сигнатура с различен тип на </a:t>
             </a:r>
             <a:r>
-              <a:rPr lang="en-US" sz="3400" dirty="0"/>
+              <a:rPr lang="en-US" sz="3400"/>
               <a:t>return</a:t>
             </a:r>
             <a:r>
-              <a:rPr lang="bg-BG" sz="3400" dirty="0"/>
+              <a:rPr lang="bg-BG" sz="3400"/>
               <a:t> стойност</a:t>
             </a:r>
-            <a:endParaRPr lang="en-US" sz="3400" dirty="0"/>
+            <a:endParaRPr lang="en-US" sz="3400"/>
           </a:p>
         </p:txBody>
       </p:sp>
@@ -19797,25 +19856,12 @@
               <a:t>string </a:t>
             </a:r>
             <a:r>
-              <a:rPr lang="en-US" sz="2500" u="wavyHeavy" noProof="1">
+              <a:rPr lang="en-US" sz="2500" noProof="1">
                 <a:solidFill>
                   <a:schemeClr val="tx1"/>
                 </a:solidFill>
-                <a:uFill>
-                  <a:solidFill>
-                    <a:srgbClr val="FF0000"/>
-                  </a:solidFill>
-                </a:uFill>
-              </a:rPr>
-              <a:t>Print</a:t>
-            </a:r>
-            <a:r>
-              <a:rPr lang="en-US" sz="2500" noProof="1">
-                <a:solidFill>
-                  <a:schemeClr val="tx1"/>
-                </a:solidFill>
-              </a:rPr>
-              <a:t>(string text)</a:t>
+              </a:rPr>
+              <a:t>Print(string text)</a:t>
             </a:r>
           </a:p>
           <a:p>
@@ -20184,7 +20230,12 @@
             <p:ph type="title" sz="quarter" idx="10"/>
           </p:nvPr>
         </p:nvSpPr>
-        <p:spPr/>
+        <p:spPr>
+          <a:xfrm>
+            <a:off x="619223" y="4888041"/>
+            <a:ext cx="10961783" cy="768084"/>
+          </a:xfrm>
+        </p:spPr>
         <p:txBody>
           <a:bodyPr/>
           <a:lstStyle/>
@@ -22852,7 +22903,7 @@
         </p:nvSpPr>
         <p:spPr bwMode="auto">
           <a:xfrm>
-            <a:off x="7769938" y="5868645"/>
+            <a:off x="7769938" y="6005838"/>
             <a:ext cx="2215664" cy="495000"/>
           </a:xfrm>
           <a:prstGeom prst="wedgeRoundRectCallout">
@@ -23059,15 +23110,33 @@
                                   </p:childTnLst>
                                 </p:cTn>
                               </p:par>
+                            </p:childTnLst>
+                          </p:cTn>
+                        </p:par>
+                      </p:childTnLst>
+                    </p:cTn>
+                  </p:par>
+                  <p:par>
+                    <p:cTn id="9" fill="hold">
+                      <p:stCondLst>
+                        <p:cond delay="indefinite"/>
+                      </p:stCondLst>
+                      <p:childTnLst>
+                        <p:par>
+                          <p:cTn id="10" fill="hold">
+                            <p:stCondLst>
+                              <p:cond delay="0"/>
+                            </p:stCondLst>
+                            <p:childTnLst>
                               <p:par>
-                                <p:cTn id="9" presetID="1" presetClass="entr" presetSubtype="0" fill="hold" grpId="0" nodeType="withEffect">
+                                <p:cTn id="11" presetID="1" presetClass="entr" presetSubtype="0" fill="hold" grpId="0" nodeType="clickEffect">
                                   <p:stCondLst>
                                     <p:cond delay="0"/>
                                   </p:stCondLst>
                                   <p:childTnLst>
                                     <p:set>
                                       <p:cBhvr>
-                                        <p:cTn id="10" dur="1" fill="hold">
+                                        <p:cTn id="12" dur="1" fill="hold">
                                           <p:stCondLst>
                                             <p:cond delay="0"/>
                                           </p:stCondLst>
@@ -24051,22 +24120,22 @@
               <a:defRPr/>
             </a:pPr>
             <a:r>
-              <a:rPr lang="bg-BG" sz="4000" dirty="0"/>
+              <a:rPr lang="bg-BG" sz="4000"/>
               <a:t>Решение</a:t>
             </a:r>
             <a:r>
-              <a:rPr lang="en-US" sz="4000" dirty="0"/>
+              <a:rPr lang="en-US" sz="4000"/>
               <a:t>: </a:t>
             </a:r>
             <a:r>
-              <a:rPr lang="bg-BG" sz="4000" dirty="0"/>
+              <a:rPr lang="bg-BG" sz="4000"/>
               <a:t>Животни</a:t>
             </a:r>
             <a:r>
-              <a:rPr lang="en-US" sz="4000" dirty="0"/>
+              <a:rPr lang="en-US" sz="4000"/>
               <a:t> (1)</a:t>
             </a:r>
-            <a:endParaRPr lang="bg-BG" sz="4000" dirty="0"/>
+            <a:endParaRPr lang="bg-BG" sz="4000"/>
           </a:p>
         </p:txBody>
       </p:sp>
@@ -24141,8 +24210,21 @@
                   <a:schemeClr val="accent2"/>
                 </a:solidFill>
               </a:rPr>
-              <a:t>// Create Constructor</a:t>
-            </a:r>
+              <a:t>// </a:t>
+            </a:r>
+            <a:r>
+              <a:rPr lang="bg-BG" sz="2600" i="1" dirty="0">
+                <a:solidFill>
+                  <a:schemeClr val="accent2"/>
+                </a:solidFill>
+              </a:rPr>
+              <a:t>Добавете конструктор</a:t>
+            </a:r>
+            <a:endParaRPr lang="en-US" sz="2600" i="1" dirty="0">
+              <a:solidFill>
+                <a:schemeClr val="accent2"/>
+              </a:solidFill>
+            </a:endParaRPr>
           </a:p>
           <a:p>
             <a:r>
@@ -24153,7 +24235,15 @@
           <a:p>
             <a:r>
               <a:rPr lang="en-US" sz="2600" dirty="0"/>
-              <a:t>  public string FavouriteFood { get; private set; }</a:t>
+              <a:t>  public string </a:t>
+            </a:r>
+            <a:r>
+              <a:rPr lang="en-US" sz="2600" dirty="0" err="1"/>
+              <a:t>FavouriteFood</a:t>
+            </a:r>
+            <a:r>
+              <a:rPr lang="en-US" sz="2600" dirty="0"/>
+              <a:t> { get; private set; }</a:t>
             </a:r>
           </a:p>
           <a:p>
@@ -24184,19 +24274,43 @@
           <a:p>
             <a:r>
               <a:rPr lang="en-US" sz="2600" dirty="0"/>
-              <a:t>    return string.Format(</a:t>
-            </a:r>
-          </a:p>
-          <a:p>
+              <a:t>    return </a:t>
+            </a:r>
+            <a:r>
+              <a:rPr lang="en-US" sz="2600" dirty="0" err="1"/>
+              <a:t>string.Format</a:t>
+            </a:r>
             <a:r>
               <a:rPr lang="en-US" sz="2600" dirty="0"/>
-              <a:t>      "I am {0} and my favourite food is {1}",</a:t>
+              <a:t>(</a:t>
             </a:r>
           </a:p>
           <a:p>
             <a:r>
               <a:rPr lang="en-US" sz="2600" dirty="0"/>
-              <a:t>      this.Name,</a:t>
+              <a:t>      "I am {0} and my </a:t>
+            </a:r>
+            <a:r>
+              <a:rPr lang="en-US" sz="2600" dirty="0" err="1"/>
+              <a:t>favourite</a:t>
+            </a:r>
+            <a:r>
+              <a:rPr lang="en-US" sz="2600" dirty="0"/>
+              <a:t> food is {1}",</a:t>
+            </a:r>
+          </a:p>
+          <a:p>
+            <a:r>
+              <a:rPr lang="en-US" sz="2600" dirty="0"/>
+              <a:t>      </a:t>
+            </a:r>
+            <a:r>
+              <a:rPr lang="en-US" sz="2600" dirty="0" err="1"/>
+              <a:t>this.Name</a:t>
+            </a:r>
+            <a:r>
+              <a:rPr lang="en-US" sz="2600" dirty="0"/>
+              <a:t>,</a:t>
             </a:r>
           </a:p>
           <a:p>
@@ -24261,7 +24375,7 @@
               <a:pPr/>
               <a:t>27</a:t>
             </a:fld>
-            <a:endParaRPr lang="en-US" noProof="0" dirty="0"/>
+            <a:endParaRPr lang="en-US" noProof="0"/>
           </a:p>
         </p:txBody>
       </p:sp>
@@ -24630,22 +24744,22 @@
               <a:defRPr/>
             </a:pPr>
             <a:r>
-              <a:rPr lang="bg-BG" sz="4000" dirty="0"/>
+              <a:rPr lang="bg-BG" sz="4000"/>
               <a:t>Решение</a:t>
             </a:r>
             <a:r>
-              <a:rPr lang="en-US" sz="4000" dirty="0"/>
+              <a:rPr lang="en-US" sz="4000"/>
               <a:t>: </a:t>
             </a:r>
             <a:r>
-              <a:rPr lang="bg-BG" sz="4000" dirty="0"/>
+              <a:rPr lang="bg-BG" sz="4000"/>
               <a:t>Животни</a:t>
             </a:r>
             <a:r>
-              <a:rPr lang="en-US" sz="4000" dirty="0"/>
+              <a:rPr lang="en-US" sz="4000"/>
               <a:t> (2)</a:t>
             </a:r>
-            <a:endParaRPr lang="bg-BG" sz="4000" dirty="0"/>
+            <a:endParaRPr lang="bg-BG" sz="4000"/>
           </a:p>
         </p:txBody>
       </p:sp>
@@ -24706,7 +24820,7 @@
               </a:spcAft>
             </a:pPr>
             <a:r>
-              <a:rPr lang="en-US" sz="2600" dirty="0"/>
+              <a:rPr lang="en-US" sz="2600"/>
               <a:t>public class Dog : Animal</a:t>
             </a:r>
           </a:p>
@@ -24720,7 +24834,7 @@
               </a:spcAft>
             </a:pPr>
             <a:r>
-              <a:rPr lang="en-US" sz="2600" dirty="0"/>
+              <a:rPr lang="en-US" sz="2600"/>
               <a:t>{</a:t>
             </a:r>
           </a:p>
@@ -24734,7 +24848,7 @@
               </a:spcAft>
             </a:pPr>
             <a:r>
-              <a:rPr lang="en-US" sz="2600" dirty="0"/>
+              <a:rPr lang="en-US" sz="2600"/>
               <a:t>  public Dog(string name, string favouriteFood)</a:t>
             </a:r>
           </a:p>
@@ -24748,7 +24862,7 @@
               </a:spcAft>
             </a:pPr>
             <a:r>
-              <a:rPr lang="en-US" sz="2600" dirty="0"/>
+              <a:rPr lang="en-US" sz="2600"/>
               <a:t>    : base(name, </a:t>
             </a:r>
             <a:r>
@@ -24756,23 +24870,23 @@
               <a:t>favouriteFood</a:t>
             </a:r>
             <a:r>
-              <a:rPr lang="en-US" sz="2600" dirty="0"/>
+              <a:rPr lang="en-US" sz="2600"/>
               <a:t>)</a:t>
             </a:r>
             <a:r>
-              <a:rPr lang="bg-BG" sz="2600" dirty="0"/>
+              <a:rPr lang="bg-BG" sz="2600"/>
               <a:t> </a:t>
             </a:r>
             <a:r>
-              <a:rPr lang="en-US" sz="2600" dirty="0"/>
+              <a:rPr lang="en-US" sz="2600"/>
               <a:t>{</a:t>
             </a:r>
             <a:r>
-              <a:rPr lang="bg-BG" sz="2600" dirty="0"/>
+              <a:rPr lang="bg-BG" sz="2600"/>
               <a:t> </a:t>
             </a:r>
             <a:r>
-              <a:rPr lang="en-US" sz="2600" dirty="0"/>
+              <a:rPr lang="en-US" sz="2600"/>
               <a:t>}</a:t>
             </a:r>
           </a:p>
@@ -24785,7 +24899,7 @@
                 <a:spcPts val="200"/>
               </a:spcAft>
             </a:pPr>
-            <a:endParaRPr lang="en-US" sz="1000" dirty="0"/>
+            <a:endParaRPr lang="en-US" sz="1000"/>
           </a:p>
           <a:p>
             <a:pPr>
@@ -24797,7 +24911,7 @@
               </a:spcAft>
             </a:pPr>
             <a:r>
-              <a:rPr lang="en-US" sz="2600" dirty="0"/>
+              <a:rPr lang="en-US" sz="2600"/>
               <a:t>  public override string ExplainSelf()</a:t>
             </a:r>
           </a:p>
@@ -24811,7 +24925,7 @@
               </a:spcAft>
             </a:pPr>
             <a:r>
-              <a:rPr lang="en-US" sz="2600" dirty="0"/>
+              <a:rPr lang="en-US" sz="2600"/>
               <a:t>  {</a:t>
             </a:r>
           </a:p>
@@ -24825,7 +24939,7 @@
               </a:spcAft>
             </a:pPr>
             <a:r>
-              <a:rPr lang="en-US" sz="2600" dirty="0"/>
+              <a:rPr lang="en-US" sz="2600"/>
               <a:t>    return base.ExplainSelf() +</a:t>
             </a:r>
           </a:p>
@@ -24839,7 +24953,7 @@
               </a:spcAft>
             </a:pPr>
             <a:r>
-              <a:rPr lang="en-US" sz="2600" dirty="0"/>
+              <a:rPr lang="en-US" sz="2600"/>
               <a:t>    </a:t>
             </a:r>
             <a:r>
@@ -24847,7 +24961,7 @@
               <a:t>Environment.NewLine</a:t>
             </a:r>
             <a:r>
-              <a:rPr lang="en-US" sz="2600" dirty="0"/>
+              <a:rPr lang="en-US" sz="2600"/>
               <a:t> +</a:t>
             </a:r>
           </a:p>
@@ -24861,7 +24975,7 @@
               </a:spcAft>
             </a:pPr>
             <a:r>
-              <a:rPr lang="en-US" sz="2600" dirty="0"/>
+              <a:rPr lang="en-US" sz="2600"/>
               <a:t>    "BARK";</a:t>
             </a:r>
           </a:p>
@@ -24875,7 +24989,7 @@
               </a:spcAft>
             </a:pPr>
             <a:r>
-              <a:rPr lang="en-US" sz="2600" dirty="0"/>
+              <a:rPr lang="en-US" sz="2600"/>
               <a:t>  }</a:t>
             </a:r>
           </a:p>
@@ -24889,7 +25003,7 @@
               </a:spcAft>
             </a:pPr>
             <a:r>
-              <a:rPr lang="en-US" sz="2600" dirty="0"/>
+              <a:rPr lang="en-US" sz="2600"/>
               <a:t>}</a:t>
             </a:r>
           </a:p>
@@ -24933,7 +25047,7 @@
               <a:pPr/>
               <a:t>28</a:t>
             </a:fld>
-            <a:endParaRPr lang="en-US" noProof="0" dirty="0"/>
+            <a:endParaRPr lang="en-US" noProof="0"/>
           </a:p>
         </p:txBody>
       </p:sp>
@@ -25400,7 +25514,7 @@
               </a:spcAft>
             </a:pPr>
             <a:r>
-              <a:rPr lang="en-US" sz="2600" dirty="0"/>
+              <a:rPr lang="en-US" sz="2600"/>
               <a:t>public class Cat : Animal</a:t>
             </a:r>
           </a:p>
@@ -25414,7 +25528,7 @@
               </a:spcAft>
             </a:pPr>
             <a:r>
-              <a:rPr lang="en-US" sz="2600" dirty="0"/>
+              <a:rPr lang="en-US" sz="2600"/>
               <a:t>{</a:t>
             </a:r>
           </a:p>
@@ -25428,7 +25542,7 @@
               </a:spcAft>
             </a:pPr>
             <a:r>
-              <a:rPr lang="en-US" sz="2600" dirty="0"/>
+              <a:rPr lang="en-US" sz="2600"/>
               <a:t>  public Cat(string name, string favouriteFood)</a:t>
             </a:r>
           </a:p>
@@ -25442,7 +25556,7 @@
               </a:spcAft>
             </a:pPr>
             <a:r>
-              <a:rPr lang="en-US" sz="2600" dirty="0"/>
+              <a:rPr lang="en-US" sz="2600"/>
               <a:t>    : base(name, </a:t>
             </a:r>
             <a:r>
@@ -25450,23 +25564,23 @@
               <a:t>favouriteFood</a:t>
             </a:r>
             <a:r>
-              <a:rPr lang="en-US" sz="2600" dirty="0"/>
+              <a:rPr lang="en-US" sz="2600"/>
               <a:t>)</a:t>
             </a:r>
             <a:r>
-              <a:rPr lang="bg-BG" sz="2600" dirty="0"/>
+              <a:rPr lang="bg-BG" sz="2600"/>
               <a:t> </a:t>
             </a:r>
             <a:r>
-              <a:rPr lang="en-US" sz="2600" dirty="0"/>
+              <a:rPr lang="en-US" sz="2600"/>
               <a:t>{</a:t>
             </a:r>
             <a:r>
-              <a:rPr lang="bg-BG" sz="2600" dirty="0"/>
+              <a:rPr lang="bg-BG" sz="2600"/>
               <a:t> </a:t>
             </a:r>
             <a:r>
-              <a:rPr lang="en-US" sz="2600" dirty="0"/>
+              <a:rPr lang="en-US" sz="2600"/>
               <a:t>}</a:t>
             </a:r>
           </a:p>
@@ -25479,7 +25593,7 @@
                 <a:spcPts val="200"/>
               </a:spcAft>
             </a:pPr>
-            <a:endParaRPr lang="en-US" sz="1000" dirty="0"/>
+            <a:endParaRPr lang="en-US" sz="1000"/>
           </a:p>
           <a:p>
             <a:pPr>
@@ -25491,7 +25605,7 @@
               </a:spcAft>
             </a:pPr>
             <a:r>
-              <a:rPr lang="en-US" sz="2600" dirty="0"/>
+              <a:rPr lang="en-US" sz="2600"/>
               <a:t>  public override string ExplainSelf()</a:t>
             </a:r>
           </a:p>
@@ -25505,7 +25619,7 @@
               </a:spcAft>
             </a:pPr>
             <a:r>
-              <a:rPr lang="en-US" sz="2600" dirty="0"/>
+              <a:rPr lang="en-US" sz="2600"/>
               <a:t>  {</a:t>
             </a:r>
           </a:p>
@@ -25519,7 +25633,7 @@
               </a:spcAft>
             </a:pPr>
             <a:r>
-              <a:rPr lang="en-US" sz="2600" dirty="0"/>
+              <a:rPr lang="en-US" sz="2600"/>
               <a:t>    return base.ExplainSelf() +</a:t>
             </a:r>
           </a:p>
@@ -25533,7 +25647,7 @@
               </a:spcAft>
             </a:pPr>
             <a:r>
-              <a:rPr lang="en-US" sz="2600" dirty="0"/>
+              <a:rPr lang="en-US" sz="2600"/>
               <a:t>    </a:t>
             </a:r>
             <a:r>
@@ -25541,7 +25655,7 @@
               <a:t>Environment.NewLine</a:t>
             </a:r>
             <a:r>
-              <a:rPr lang="en-US" sz="2600" dirty="0"/>
+              <a:rPr lang="en-US" sz="2600"/>
               <a:t> +</a:t>
             </a:r>
           </a:p>
@@ -25555,7 +25669,7 @@
               </a:spcAft>
             </a:pPr>
             <a:r>
-              <a:rPr lang="en-US" sz="2600" dirty="0"/>
+              <a:rPr lang="en-US" sz="2600"/>
               <a:t>    "MEOW";</a:t>
             </a:r>
           </a:p>
@@ -25569,7 +25683,7 @@
               </a:spcAft>
             </a:pPr>
             <a:r>
-              <a:rPr lang="en-US" sz="2600" dirty="0"/>
+              <a:rPr lang="en-US" sz="2600"/>
               <a:t>  }</a:t>
             </a:r>
           </a:p>
@@ -25583,7 +25697,7 @@
               </a:spcAft>
             </a:pPr>
             <a:r>
-              <a:rPr lang="en-US" sz="2600" dirty="0"/>
+              <a:rPr lang="en-US" sz="2600"/>
               <a:t>}</a:t>
             </a:r>
           </a:p>
@@ -25615,22 +25729,22 @@
               <a:defRPr/>
             </a:pPr>
             <a:r>
-              <a:rPr lang="bg-BG" sz="4000" dirty="0"/>
+              <a:rPr lang="bg-BG" sz="4000"/>
               <a:t>Решение</a:t>
             </a:r>
             <a:r>
-              <a:rPr lang="en-US" sz="4000" dirty="0"/>
+              <a:rPr lang="en-US" sz="4000"/>
               <a:t>: </a:t>
             </a:r>
             <a:r>
-              <a:rPr lang="bg-BG" sz="4000" dirty="0"/>
+              <a:rPr lang="bg-BG" sz="4000"/>
               <a:t>Животни</a:t>
             </a:r>
             <a:r>
-              <a:rPr lang="en-US" sz="4000" dirty="0"/>
+              <a:rPr lang="en-US" sz="4000"/>
               <a:t> (3)</a:t>
             </a:r>
-            <a:endParaRPr lang="bg-BG" sz="4000" dirty="0"/>
+            <a:endParaRPr lang="bg-BG" sz="4000"/>
           </a:p>
         </p:txBody>
       </p:sp>
@@ -25672,7 +25786,7 @@
               <a:pPr/>
               <a:t>29</a:t>
             </a:fld>
-            <a:endParaRPr lang="en-US" noProof="0" dirty="0"/>
+            <a:endParaRPr lang="en-US" noProof="0"/>
           </a:p>
         </p:txBody>
       </p:sp>
@@ -26343,7 +26457,7 @@
           <a:lstStyle/>
           <a:p>
             <a:r>
-              <a:rPr lang="bg-BG"/>
+              <a:rPr lang="bg-BG" dirty="0"/>
               <a:t>Полиморфизъм</a:t>
             </a:r>
             <a:endParaRPr lang="en-US" dirty="0"/>
@@ -26448,7 +26562,7 @@
           <a:lstStyle/>
           <a:p>
             <a:pPr algn="ctr"/>
-            <a:endParaRPr lang="en-US" sz="2400" b="1" dirty="0">
+            <a:endParaRPr lang="en-US" sz="2400" b="1">
               <a:solidFill>
                 <a:schemeClr val="bg2"/>
               </a:solidFill>
@@ -26475,11 +26589,11 @@
           <a:p>
             <a:r>
               <a:rPr lang="bg-BG" sz="3400" noProof="1"/>
-              <a:t>Правила за презаписване на метод (</a:t>
+              <a:t>Правила за презаписване на метод </a:t>
             </a:r>
             <a:r>
               <a:rPr lang="en-US" sz="3400" noProof="1"/>
-              <a:t>overriding) (1)</a:t>
+              <a:t>(1)</a:t>
             </a:r>
             <a:endParaRPr lang="en-US" sz="3400" dirty="0"/>
           </a:p>
@@ -26918,8 +27032,8 @@
           </a:xfrm>
           <a:prstGeom prst="wedgeRoundRectCallout">
             <a:avLst>
-              <a:gd name="adj1" fmla="val -98654"/>
-              <a:gd name="adj2" fmla="val -92564"/>
+              <a:gd name="adj1" fmla="val -96610"/>
+              <a:gd name="adj2" fmla="val -78583"/>
               <a:gd name="adj3" fmla="val 16667"/>
             </a:avLst>
           </a:prstGeom>
@@ -26969,7 +27083,7 @@
                   <a:schemeClr val="bg2"/>
                 </a:solidFill>
               </a:rPr>
-              <a:t>override </a:t>
+              <a:t>Override </a:t>
             </a:r>
             <a:r>
               <a:rPr lang="bg-BG" sz="2400" b="1" dirty="0">
@@ -27096,14 +27210,14 @@
           <a:p>
             <a:pPr algn="ctr"/>
             <a:r>
-              <a:rPr lang="bg-BG" sz="2400" b="1" dirty="0">
+              <a:rPr lang="bg-BG" sz="2400" b="1">
                 <a:solidFill>
                   <a:schemeClr val="bg2"/>
                 </a:solidFill>
               </a:rPr>
               <a:t>Еднаква върната стойност и сигнатура</a:t>
             </a:r>
-            <a:endParaRPr lang="en-US" sz="2400" b="1" dirty="0">
+            <a:endParaRPr lang="en-US" sz="2400" b="1">
               <a:solidFill>
                 <a:schemeClr val="bg2"/>
               </a:solidFill>
@@ -27121,13 +27235,13 @@
         </p:nvSpPr>
         <p:spPr bwMode="auto">
           <a:xfrm>
-            <a:off x="5367235" y="1132324"/>
-            <a:ext cx="2390058" cy="1081675"/>
+            <a:off x="5916000" y="1129508"/>
+            <a:ext cx="2096556" cy="1081675"/>
           </a:xfrm>
           <a:prstGeom prst="wedgeRoundRectCallout">
             <a:avLst>
-              <a:gd name="adj1" fmla="val -138988"/>
-              <a:gd name="adj2" fmla="val 29202"/>
+              <a:gd name="adj1" fmla="val -182438"/>
+              <a:gd name="adj2" fmla="val 28195"/>
               <a:gd name="adj3" fmla="val 16667"/>
             </a:avLst>
           </a:prstGeom>
@@ -27172,14 +27286,14 @@
           <a:p>
             <a:pPr algn="ctr"/>
             <a:r>
-              <a:rPr lang="bg-BG" sz="2400" b="1" dirty="0">
+              <a:rPr lang="bg-BG" sz="2400" b="1">
                 <a:solidFill>
                   <a:schemeClr val="bg2"/>
                 </a:solidFill>
               </a:rPr>
               <a:t>Виртуален метод в базовия клас</a:t>
             </a:r>
-            <a:endParaRPr lang="en-US" sz="2400" b="1" dirty="0">
+            <a:endParaRPr lang="en-US" sz="2400" b="1">
               <a:solidFill>
                 <a:schemeClr val="bg2"/>
               </a:solidFill>
@@ -27199,7 +27313,7 @@
         </p:nvSpPr>
         <p:spPr>
           <a:xfrm>
-            <a:off x="7757293" y="1269000"/>
+            <a:off x="8211000" y="1327913"/>
             <a:ext cx="4179444" cy="1674741"/>
           </a:xfrm>
         </p:spPr>
@@ -27333,7 +27447,7 @@
               <a:pPr/>
               <a:t>30</a:t>
             </a:fld>
-            <a:endParaRPr lang="en-US" noProof="0" dirty="0"/>
+            <a:endParaRPr lang="en-US" noProof="0"/>
           </a:p>
         </p:txBody>
       </p:sp>
@@ -27651,7 +27765,7 @@
               </a:buClr>
             </a:pPr>
             <a:r>
-              <a:rPr lang="bg-BG" b="1" dirty="0">
+              <a:rPr lang="bg-BG" b="1">
                 <a:solidFill>
                   <a:schemeClr val="bg1"/>
                 </a:solidFill>
@@ -27659,23 +27773,23 @@
               <a:t>Виртуалните</a:t>
             </a:r>
             <a:r>
-              <a:rPr lang="en-US" dirty="0"/>
+              <a:rPr lang="en-US"/>
               <a:t> </a:t>
             </a:r>
             <a:r>
-              <a:rPr lang="bg-BG" dirty="0"/>
+              <a:rPr lang="bg-BG"/>
               <a:t>членове</a:t>
             </a:r>
             <a:r>
-              <a:rPr lang="en-US" dirty="0"/>
+              <a:rPr lang="en-US"/>
               <a:t> </a:t>
             </a:r>
             <a:r>
-              <a:rPr lang="bg-BG" dirty="0"/>
+              <a:rPr lang="bg-BG"/>
               <a:t>използват </a:t>
             </a:r>
             <a:r>
-              <a:rPr lang="bg-BG" b="1" dirty="0">
+              <a:rPr lang="bg-BG" b="1">
                 <a:solidFill>
                   <a:schemeClr val="bg1"/>
                 </a:solidFill>
@@ -27683,7 +27797,7 @@
               <a:t>ключовата дума</a:t>
             </a:r>
             <a:r>
-              <a:rPr lang="en-US" b="1" dirty="0">
+              <a:rPr lang="en-US" b="1">
                 <a:solidFill>
                   <a:schemeClr val="bg1"/>
                 </a:solidFill>
@@ -27691,7 +27805,7 @@
               <a:t> </a:t>
             </a:r>
             <a:r>
-              <a:rPr lang="en-US" b="1" dirty="0">
+              <a:rPr lang="en-US" b="1">
                 <a:solidFill>
                   <a:schemeClr val="bg1"/>
                 </a:solidFill>
@@ -27700,18 +27814,18 @@
               <a:t>base</a:t>
             </a:r>
             <a:r>
-              <a:rPr lang="bg-BG" dirty="0"/>
+              <a:rPr lang="bg-BG"/>
               <a:t>, за да извикат </a:t>
             </a:r>
             <a:r>
-              <a:rPr lang="bg-BG" b="1" dirty="0">
+              <a:rPr lang="bg-BG" b="1">
                 <a:solidFill>
                   <a:schemeClr val="bg1"/>
                 </a:solidFill>
               </a:rPr>
               <a:t>базовия клас</a:t>
             </a:r>
-            <a:endParaRPr lang="en-US" b="1" dirty="0">
+            <a:endParaRPr lang="en-US" b="1">
               <a:solidFill>
                 <a:schemeClr val="bg1"/>
               </a:solidFill>
@@ -27723,7 +27837,7 @@
                 <a:schemeClr val="tx1"/>
               </a:buClr>
             </a:pPr>
-            <a:endParaRPr lang="en-US" b="1" dirty="0">
+            <a:endParaRPr lang="en-US" b="1">
               <a:solidFill>
                 <a:schemeClr val="bg1"/>
               </a:solidFill>
@@ -27735,7 +27849,7 @@
                 <a:schemeClr val="tx1"/>
               </a:buClr>
             </a:pPr>
-            <a:endParaRPr lang="en-US" b="1" dirty="0">
+            <a:endParaRPr lang="en-US" b="1">
               <a:solidFill>
                 <a:schemeClr val="bg1"/>
               </a:solidFill>
@@ -27748,7 +27862,7 @@
               </a:buClr>
               <a:buNone/>
             </a:pPr>
-            <a:endParaRPr lang="en-US" b="1" dirty="0">
+            <a:endParaRPr lang="en-US" b="1">
               <a:solidFill>
                 <a:schemeClr val="bg1"/>
               </a:solidFill>
@@ -27761,7 +27875,7 @@
               </a:buClr>
               <a:buNone/>
             </a:pPr>
-            <a:endParaRPr lang="en-US" b="1" dirty="0">
+            <a:endParaRPr lang="en-US" b="1">
               <a:solidFill>
                 <a:schemeClr val="bg1"/>
               </a:solidFill>
@@ -27774,7 +27888,7 @@
               </a:buClr>
               <a:buNone/>
             </a:pPr>
-            <a:endParaRPr lang="en-US" b="1" dirty="0">
+            <a:endParaRPr lang="en-US" b="1">
               <a:solidFill>
                 <a:schemeClr val="bg1"/>
               </a:solidFill>
@@ -27786,7 +27900,7 @@
                 <a:schemeClr val="tx1"/>
               </a:buClr>
             </a:pPr>
-            <a:endParaRPr lang="en-US" b="1" dirty="0">
+            <a:endParaRPr lang="en-US" b="1">
               <a:solidFill>
                 <a:schemeClr val="bg1"/>
               </a:solidFill>
@@ -27813,11 +27927,11 @@
           <a:p>
             <a:r>
               <a:rPr lang="bg-BG" sz="3400" noProof="1"/>
-              <a:t>Правила за презаписване на метод (</a:t>
+              <a:t>Правила за презаписване на метод</a:t>
             </a:r>
             <a:r>
               <a:rPr lang="en-US" sz="3400" noProof="1"/>
-              <a:t>overriding) (</a:t>
+              <a:t> (</a:t>
             </a:r>
             <a:r>
               <a:rPr lang="bg-BG" sz="3400" noProof="1"/>
@@ -28237,14 +28351,14 @@
           <a:p>
             <a:pPr algn="ctr"/>
             <a:r>
-              <a:rPr lang="bg-BG" sz="2400" b="1" dirty="0">
+              <a:rPr lang="bg-BG" sz="2400" b="1">
                 <a:solidFill>
                   <a:schemeClr val="bg2"/>
                 </a:solidFill>
               </a:rPr>
               <a:t>Разширява виртуалния метод на базовия клас</a:t>
             </a:r>
-            <a:endParaRPr lang="en-US" sz="2400" b="1" dirty="0">
+            <a:endParaRPr lang="en-US" sz="2400" b="1">
               <a:solidFill>
                 <a:schemeClr val="bg2"/>
               </a:solidFill>
@@ -28313,14 +28427,14 @@
           <a:p>
             <a:pPr algn="ctr"/>
             <a:r>
-              <a:rPr lang="bg-BG" sz="2400" b="1" dirty="0">
+              <a:rPr lang="bg-BG" sz="2400" b="1">
                 <a:solidFill>
                   <a:schemeClr val="bg2"/>
                 </a:solidFill>
               </a:rPr>
               <a:t>Може да добави ново поведение</a:t>
             </a:r>
-            <a:endParaRPr lang="en-US" sz="2400" b="1" dirty="0">
+            <a:endParaRPr lang="en-US" sz="2400" b="1">
               <a:solidFill>
                 <a:schemeClr val="bg2"/>
               </a:solidFill>
@@ -28366,7 +28480,7 @@
               <a:pPr/>
               <a:t>31</a:t>
             </a:fld>
-            <a:endParaRPr lang="en-US" noProof="0" dirty="0"/>
+            <a:endParaRPr lang="en-US" noProof="0"/>
           </a:p>
         </p:txBody>
       </p:sp>
@@ -28615,11 +28729,11 @@
               </a:buClr>
             </a:pPr>
             <a:r>
-              <a:rPr lang="bg-BG" sz="3200" dirty="0"/>
+              <a:rPr lang="bg-BG" sz="3200"/>
               <a:t>Производен клас </a:t>
             </a:r>
             <a:r>
-              <a:rPr lang="bg-BG" sz="3200" b="1" dirty="0">
+              <a:rPr lang="bg-BG" sz="3200" b="1">
                 <a:solidFill>
                   <a:schemeClr val="bg1"/>
                 </a:solidFill>
@@ -28627,11 +28741,11 @@
               <a:t>може да спре</a:t>
             </a:r>
             <a:r>
-              <a:rPr lang="en-US" sz="3200" dirty="0"/>
+              <a:rPr lang="en-US" sz="3200"/>
               <a:t> </a:t>
             </a:r>
             <a:r>
-              <a:rPr lang="bg-BG" sz="3200" b="1" dirty="0">
+              <a:rPr lang="bg-BG" sz="3200" b="1">
                 <a:solidFill>
                   <a:schemeClr val="bg1"/>
                 </a:solidFill>
@@ -28639,11 +28753,11 @@
               <a:t>виртуалното</a:t>
             </a:r>
             <a:r>
-              <a:rPr lang="en-US" sz="3200" dirty="0"/>
+              <a:rPr lang="en-US" sz="3200"/>
               <a:t> </a:t>
             </a:r>
             <a:r>
-              <a:rPr lang="bg-BG" sz="3200" b="1" dirty="0">
+              <a:rPr lang="bg-BG" sz="3200" b="1">
                 <a:solidFill>
                   <a:schemeClr val="bg1"/>
                 </a:solidFill>
@@ -28651,23 +28765,23 @@
               <a:t>наследяване </a:t>
             </a:r>
             <a:r>
-              <a:rPr lang="bg-BG" sz="3200" dirty="0"/>
+              <a:rPr lang="bg-BG" sz="3200"/>
               <a:t>като декларира </a:t>
             </a:r>
             <a:r>
-              <a:rPr lang="en-US" sz="3200" dirty="0"/>
+              <a:rPr lang="en-US" sz="3200"/>
               <a:t>override </a:t>
             </a:r>
             <a:r>
-              <a:rPr lang="bg-BG" sz="3200" dirty="0"/>
+              <a:rPr lang="bg-BG" sz="3200"/>
               <a:t>като</a:t>
             </a:r>
             <a:r>
-              <a:rPr lang="en-US" sz="3200" dirty="0"/>
+              <a:rPr lang="en-US" sz="3200"/>
               <a:t> </a:t>
             </a:r>
             <a:r>
-              <a:rPr lang="en-US" sz="3200" b="1" dirty="0">
+              <a:rPr lang="en-US" sz="3200" b="1">
                 <a:solidFill>
                   <a:schemeClr val="bg1"/>
                 </a:solidFill>
@@ -28676,7 +28790,7 @@
               <a:t>sealed</a:t>
             </a:r>
             <a:r>
-              <a:rPr lang="bg-BG" sz="3200" b="1" dirty="0">
+              <a:rPr lang="bg-BG" sz="3200" b="1">
                 <a:solidFill>
                   <a:schemeClr val="bg1"/>
                 </a:solidFill>
@@ -28685,10 +28799,10 @@
               <a:t> </a:t>
             </a:r>
             <a:r>
-              <a:rPr lang="bg-BG" sz="3600" dirty="0"/>
+              <a:rPr lang="bg-BG" sz="3600"/>
               <a:t>(„запечатан“)</a:t>
             </a:r>
-            <a:endParaRPr lang="en-US" dirty="0"/>
+            <a:endParaRPr lang="en-US"/>
           </a:p>
         </p:txBody>
       </p:sp>
@@ -28725,7 +28839,7 @@
               <a:rPr lang="en-US" sz="3400" noProof="1"/>
               <a:t>)</a:t>
             </a:r>
-            <a:endParaRPr lang="en-US" sz="3400" dirty="0"/>
+            <a:endParaRPr lang="en-US" sz="3400"/>
           </a:p>
         </p:txBody>
       </p:sp>
@@ -29318,11 +29432,17 @@
               </a:spcAft>
             </a:pPr>
             <a:r>
-              <a:rPr lang="en-US" sz="3200" dirty="0"/>
+              <a:rPr lang="en-US" sz="3200" dirty="0">
+                <a:latin typeface="Calibri" panose="020F0502020204030204" pitchFamily="34" charset="0"/>
+                <a:cs typeface="Calibri" panose="020F0502020204030204" pitchFamily="34" charset="0"/>
+              </a:rPr>
               <a:t>Sealed </a:t>
             </a:r>
             <a:r>
-              <a:rPr lang="bg-BG" sz="3200" dirty="0"/>
+              <a:rPr lang="bg-BG" sz="3200" dirty="0">
+                <a:latin typeface="Calibri" panose="020F0502020204030204" pitchFamily="34" charset="0"/>
+                <a:cs typeface="Calibri" panose="020F0502020204030204" pitchFamily="34" charset="0"/>
+              </a:rPr>
               <a:t>методите могат да бъдат заместени от производните класове с  ключовата дума </a:t>
             </a:r>
             <a:r>
@@ -29415,7 +29535,7 @@
               <a:pPr/>
               <a:t>32</a:t>
             </a:fld>
-            <a:endParaRPr lang="en-US" noProof="0" dirty="0"/>
+            <a:endParaRPr lang="en-US" noProof="0"/>
           </a:p>
         </p:txBody>
       </p:sp>
@@ -29906,29 +30026,29 @@
           <a:p>
             <a:pPr lvl="0"/>
             <a:r>
-              <a:rPr lang="en-US" dirty="0"/>
+              <a:rPr lang="en-US"/>
               <a:t>…</a:t>
             </a:r>
           </a:p>
           <a:p>
             <a:pPr lvl="0"/>
             <a:r>
-              <a:rPr lang="en-GB" dirty="0"/>
+              <a:rPr lang="en-GB"/>
               <a:t>…</a:t>
             </a:r>
-            <a:endParaRPr lang="en-US" dirty="0"/>
+            <a:endParaRPr lang="en-US"/>
           </a:p>
           <a:p>
             <a:pPr lvl="0"/>
             <a:r>
-              <a:rPr lang="en-GB" dirty="0"/>
+              <a:rPr lang="en-GB"/>
               <a:t>…</a:t>
             </a:r>
-            <a:endParaRPr lang="en-US" dirty="0"/>
+            <a:endParaRPr lang="en-US"/>
           </a:p>
           <a:p>
             <a:pPr lvl="0"/>
-            <a:endParaRPr lang="en-US" dirty="0"/>
+            <a:endParaRPr lang="en-US"/>
           </a:p>
         </p:txBody>
       </p:sp>
@@ -29950,10 +30070,10 @@
           <a:lstStyle/>
           <a:p>
             <a:r>
-              <a:rPr lang="bg-BG" dirty="0"/>
+              <a:rPr lang="bg-BG"/>
               <a:t>Обобщение</a:t>
             </a:r>
-            <a:endParaRPr lang="en-US" dirty="0"/>
+            <a:endParaRPr lang="en-US"/>
           </a:p>
         </p:txBody>
       </p:sp>
@@ -30043,7 +30163,7 @@
                 <a:tabLst/>
                 <a:defRPr/>
               </a:pPr>
-              <a:endParaRPr kumimoji="0" lang="ko-KR" altLang="en-US" sz="2399" b="0" i="0" u="none" strike="noStrike" kern="1200" cap="none" spc="0" normalizeH="0" baseline="0" noProof="0" dirty="0">
+              <a:endParaRPr kumimoji="0" lang="ko-KR" altLang="en-US" sz="2399" b="0" i="0" u="none" strike="noStrike" kern="1200" cap="none" spc="0" normalizeH="0" baseline="0" noProof="0">
                 <a:ln>
                   <a:noFill/>
                 </a:ln>
@@ -30477,7 +30597,7 @@
               </a:buClr>
             </a:pPr>
             <a:r>
-              <a:rPr lang="bg-BG" sz="3400" dirty="0">
+              <a:rPr lang="bg-BG" sz="3400">
                 <a:solidFill>
                   <a:schemeClr val="bg2"/>
                 </a:solidFill>
@@ -30485,7 +30605,7 @@
               <a:t>Полиморфизъм</a:t>
             </a:r>
             <a:r>
-              <a:rPr lang="en-US" sz="3400" dirty="0">
+              <a:rPr lang="en-US" sz="3400">
                 <a:solidFill>
                   <a:schemeClr val="bg2"/>
                 </a:solidFill>
@@ -30493,7 +30613,7 @@
               <a:t> – </a:t>
             </a:r>
             <a:r>
-              <a:rPr lang="bg-BG" sz="3400" dirty="0">
+              <a:rPr lang="bg-BG" sz="3400">
                 <a:solidFill>
                   <a:schemeClr val="bg2"/>
                 </a:solidFill>
@@ -30501,7 +30621,7 @@
               <a:t>способността на един </a:t>
             </a:r>
             <a:r>
-              <a:rPr lang="bg-BG" sz="3400" dirty="0">
+              <a:rPr lang="bg-BG" sz="3400">
                 <a:solidFill>
                   <a:schemeClr val="bg1">
                     <a:lumMod val="60000"/>
@@ -30512,7 +30632,7 @@
               <a:t>обект </a:t>
             </a:r>
             <a:r>
-              <a:rPr lang="bg-BG" sz="3400" dirty="0">
+              <a:rPr lang="bg-BG" sz="3400">
                 <a:solidFill>
                   <a:schemeClr val="bg2"/>
                 </a:solidFill>
@@ -30520,7 +30640,7 @@
               <a:t>да приема </a:t>
             </a:r>
             <a:r>
-              <a:rPr lang="bg-BG" sz="3400" dirty="0">
+              <a:rPr lang="bg-BG" sz="3400">
                 <a:solidFill>
                   <a:schemeClr val="bg1">
                     <a:lumMod val="60000"/>
@@ -30530,7 +30650,7 @@
               </a:rPr>
               <a:t>много форми</a:t>
             </a:r>
-            <a:endParaRPr lang="en-US" sz="3400" dirty="0">
+            <a:endParaRPr lang="en-US" sz="3400">
               <a:solidFill>
                 <a:schemeClr val="bg1">
                   <a:lumMod val="60000"/>
@@ -30555,7 +30675,7 @@
               </a:buClr>
             </a:pPr>
             <a:r>
-              <a:rPr lang="bg-BG" sz="3400" dirty="0">
+              <a:rPr lang="bg-BG" sz="3400">
                 <a:solidFill>
                   <a:schemeClr val="bg2"/>
                 </a:solidFill>
@@ -30563,7 +30683,7 @@
               <a:t>Видове полиморфизъм</a:t>
             </a:r>
             <a:r>
-              <a:rPr lang="en-US" sz="3400" dirty="0">
+              <a:rPr lang="en-US" sz="3400">
                 <a:solidFill>
                   <a:schemeClr val="bg2"/>
                 </a:solidFill>
@@ -30587,7 +30707,7 @@
               </a:buClr>
             </a:pPr>
             <a:r>
-              <a:rPr lang="bg-BG" sz="3200" dirty="0">
+              <a:rPr lang="bg-BG" sz="3200">
                 <a:solidFill>
                   <a:schemeClr val="bg1">
                     <a:lumMod val="60000"/>
@@ -30614,7 +30734,7 @@
               </a:buClr>
             </a:pPr>
             <a:r>
-              <a:rPr lang="bg-BG" sz="3000" dirty="0">
+              <a:rPr lang="bg-BG" sz="3000">
                 <a:solidFill>
                   <a:schemeClr val="bg2"/>
                 </a:solidFill>
@@ -30622,7 +30742,7 @@
               <a:t>Осъществява се чрез </a:t>
             </a:r>
             <a:r>
-              <a:rPr lang="en-US" sz="3000" dirty="0">
+              <a:rPr lang="en-US" sz="3000">
                 <a:solidFill>
                   <a:schemeClr val="bg1">
                     <a:lumMod val="60000"/>
@@ -30633,7 +30753,7 @@
               <a:t>overloading</a:t>
             </a:r>
             <a:r>
-              <a:rPr lang="bg-BG" sz="3000" dirty="0">
+              <a:rPr lang="bg-BG" sz="3000">
                 <a:solidFill>
                   <a:schemeClr val="bg1">
                     <a:lumMod val="60000"/>
@@ -30644,7 +30764,7 @@
               <a:t> (презареждане) </a:t>
             </a:r>
             <a:r>
-              <a:rPr lang="en-US" sz="3000" dirty="0">
+              <a:rPr lang="en-US" sz="3000">
                 <a:solidFill>
                   <a:schemeClr val="bg2"/>
                 </a:solidFill>
@@ -30652,14 +30772,14 @@
               <a:t>– </a:t>
             </a:r>
             <a:r>
-              <a:rPr lang="bg-BG" sz="3000" dirty="0">
+              <a:rPr lang="bg-BG" sz="3000">
                 <a:solidFill>
                   <a:schemeClr val="bg2"/>
                 </a:solidFill>
               </a:rPr>
               <a:t>едно и също име на метода, но различна имплементация</a:t>
             </a:r>
-            <a:endParaRPr lang="en-US" sz="3000" dirty="0">
+            <a:endParaRPr lang="en-US" sz="3000">
               <a:solidFill>
                 <a:schemeClr val="bg2"/>
               </a:solidFill>
@@ -30681,7 +30801,7 @@
               </a:buClr>
             </a:pPr>
             <a:r>
-              <a:rPr lang="bg-BG" sz="3200" dirty="0">
+              <a:rPr lang="bg-BG" sz="3200">
                 <a:solidFill>
                   <a:schemeClr val="bg1">
                     <a:lumMod val="60000"/>
@@ -30691,7 +30811,7 @@
               </a:rPr>
               <a:t>По време на изпълнение</a:t>
             </a:r>
-            <a:endParaRPr lang="en-US" sz="3200" dirty="0">
+            <a:endParaRPr lang="en-US" sz="3200">
               <a:solidFill>
                 <a:schemeClr val="bg2"/>
               </a:solidFill>
@@ -30713,7 +30833,7 @@
               </a:buClr>
             </a:pPr>
             <a:r>
-              <a:rPr lang="bg-BG" sz="3000" dirty="0">
+              <a:rPr lang="bg-BG" sz="3000">
                 <a:solidFill>
                   <a:schemeClr val="bg2"/>
                 </a:solidFill>
@@ -30721,7 +30841,7 @@
               <a:t>Осъществява се чрез </a:t>
             </a:r>
             <a:r>
-              <a:rPr lang="en-US" sz="3000" dirty="0">
+              <a:rPr lang="en-US" sz="3000">
                 <a:solidFill>
                   <a:schemeClr val="bg1">
                     <a:lumMod val="60000"/>
@@ -30732,7 +30852,7 @@
               <a:t>overriding</a:t>
             </a:r>
             <a:r>
-              <a:rPr lang="bg-BG" sz="3000" dirty="0">
+              <a:rPr lang="bg-BG" sz="3000">
                 <a:solidFill>
                   <a:schemeClr val="bg1">
                     <a:lumMod val="60000"/>
@@ -30743,7 +30863,7 @@
               <a:t> (презаписване)</a:t>
             </a:r>
             <a:r>
-              <a:rPr lang="bg-BG" sz="3000" dirty="0">
+              <a:rPr lang="bg-BG" sz="3000">
                 <a:solidFill>
                   <a:schemeClr val="bg2"/>
                 </a:solidFill>
@@ -30751,7 +30871,7 @@
               <a:t> </a:t>
             </a:r>
             <a:r>
-              <a:rPr lang="en-US" sz="3000" dirty="0">
+              <a:rPr lang="en-US" sz="3000">
                 <a:solidFill>
                   <a:schemeClr val="bg2"/>
                 </a:solidFill>
@@ -30759,7 +30879,7 @@
               <a:t>– </a:t>
             </a:r>
             <a:r>
-              <a:rPr lang="bg-BG" sz="3000" dirty="0">
+              <a:rPr lang="bg-BG" sz="3000">
                 <a:solidFill>
                   <a:schemeClr val="bg2"/>
                 </a:solidFill>
@@ -30767,7 +30887,7 @@
               <a:t>чрез ключовите думи</a:t>
             </a:r>
             <a:r>
-              <a:rPr lang="en-US" sz="3000" dirty="0">
+              <a:rPr lang="en-US" sz="3000">
                 <a:solidFill>
                   <a:schemeClr val="bg2"/>
                 </a:solidFill>
@@ -30775,7 +30895,7 @@
               <a:t> </a:t>
             </a:r>
             <a:r>
-              <a:rPr lang="en-US" sz="3000" dirty="0">
+              <a:rPr lang="en-US" sz="3000">
                 <a:solidFill>
                   <a:schemeClr val="bg1">
                     <a:lumMod val="60000"/>
@@ -30786,7 +30906,7 @@
               <a:t>virtual</a:t>
             </a:r>
             <a:r>
-              <a:rPr lang="en-US" sz="3000" dirty="0">
+              <a:rPr lang="en-US" sz="3000">
                 <a:solidFill>
                   <a:schemeClr val="bg2"/>
                 </a:solidFill>
@@ -30794,7 +30914,7 @@
               <a:t> + </a:t>
             </a:r>
             <a:r>
-              <a:rPr lang="en-US" sz="3000" dirty="0">
+              <a:rPr lang="en-US" sz="3000">
                 <a:solidFill>
                   <a:schemeClr val="bg1">
                     <a:lumMod val="60000"/>
@@ -30804,7 +30924,7 @@
               </a:rPr>
               <a:t>override</a:t>
             </a:r>
-            <a:endParaRPr lang="en-US" sz="3000" dirty="0">
+            <a:endParaRPr lang="en-US" sz="3000">
               <a:solidFill>
                 <a:schemeClr val="bg2"/>
               </a:solidFill>
@@ -30850,7 +30970,7 @@
               <a:pPr/>
               <a:t>33</a:t>
             </a:fld>
-            <a:endParaRPr lang="en-US" noProof="0" dirty="0"/>
+            <a:endParaRPr lang="en-US" noProof="0"/>
           </a:p>
         </p:txBody>
       </p:sp>
@@ -31135,7 +31255,7 @@
           <a:lstStyle/>
           <a:p>
             <a:r>
-              <a:rPr lang="bg-BG" sz="8800" dirty="0">
+              <a:rPr lang="bg-BG" sz="8800">
                 <a:solidFill>
                   <a:srgbClr val="234465"/>
                 </a:solidFill>
@@ -31143,14 +31263,14 @@
               <a:t>Въпроси</a:t>
             </a:r>
             <a:r>
-              <a:rPr lang="en-US" sz="8800" dirty="0">
+              <a:rPr lang="en-US" sz="8800">
                 <a:solidFill>
                   <a:srgbClr val="234465"/>
                 </a:solidFill>
               </a:rPr>
               <a:t>?</a:t>
             </a:r>
-            <a:endParaRPr lang="en-US" sz="8800" dirty="0"/>
+            <a:endParaRPr lang="en-US" sz="8800"/>
           </a:p>
         </p:txBody>
       </p:sp>
@@ -31406,7 +31526,7 @@
           <a:lstStyle/>
           <a:p>
             <a:r>
-              <a:rPr lang="bg-BG" dirty="0"/>
+              <a:rPr lang="bg-BG"/>
               <a:t>Лиценз</a:t>
             </a:r>
           </a:p>
@@ -31450,7 +31570,7 @@
               <a:pPr/>
               <a:t>35</a:t>
             </a:fld>
-            <a:endParaRPr lang="en-US" noProof="0" dirty="0"/>
+            <a:endParaRPr lang="en-US" noProof="0"/>
           </a:p>
         </p:txBody>
       </p:sp>
@@ -31939,8 +32059,8 @@
           </a:xfrm>
           <a:prstGeom prst="wedgeRoundRectCallout">
             <a:avLst>
-              <a:gd name="adj1" fmla="val 17648"/>
-              <a:gd name="adj2" fmla="val -107741"/>
+              <a:gd name="adj1" fmla="val 13633"/>
+              <a:gd name="adj2" fmla="val -81816"/>
               <a:gd name="adj3" fmla="val 16667"/>
             </a:avLst>
           </a:prstGeom>
@@ -36035,7 +36155,12 @@
             <p:ph type="body" sz="quarter" idx="10"/>
           </p:nvPr>
         </p:nvSpPr>
-        <p:spPr/>
+        <p:spPr>
+          <a:xfrm>
+            <a:off x="190406" y="1126734"/>
+            <a:ext cx="11818096" cy="5528766"/>
+          </a:xfrm>
+        </p:spPr>
         <p:txBody>
           <a:bodyPr>
             <a:normAutofit/>
@@ -36147,7 +36272,7 @@
         </p:nvSpPr>
         <p:spPr bwMode="auto">
           <a:xfrm>
-            <a:off x="1808854" y="2764292"/>
+            <a:off x="1808854" y="2675290"/>
             <a:ext cx="8574292" cy="3849816"/>
           </a:xfrm>
           <a:prstGeom prst="rect">
@@ -36368,7 +36493,7 @@
         </p:nvSpPr>
         <p:spPr bwMode="auto">
           <a:xfrm>
-            <a:off x="4279890" y="6170614"/>
+            <a:off x="4251000" y="6111445"/>
             <a:ext cx="2941110" cy="687385"/>
           </a:xfrm>
           <a:prstGeom prst="wedgeRoundRectCallout">
@@ -36439,7 +36564,7 @@
         </p:nvSpPr>
         <p:spPr bwMode="auto">
           <a:xfrm>
-            <a:off x="6929113" y="4898892"/>
+            <a:off x="6964435" y="4820217"/>
             <a:ext cx="3898731" cy="1160940"/>
           </a:xfrm>
           <a:prstGeom prst="wedgeRoundRectCallout">
@@ -36500,10 +36625,21 @@
             <a:r>
               <a:rPr lang="en-US" sz="2400" b="1" dirty="0">
                 <a:solidFill>
+                  <a:schemeClr val="bg1">
+                    <a:lumMod val="60000"/>
+                    <a:lumOff val="40000"/>
+                  </a:schemeClr>
+                </a:solidFill>
+              </a:rPr>
+              <a:t>person</a:t>
+            </a:r>
+            <a:r>
+              <a:rPr lang="en-US" sz="2400" b="1" dirty="0">
+                <a:solidFill>
                   <a:schemeClr val="bg2"/>
                 </a:solidFill>
               </a:rPr>
-              <a:t>person </a:t>
+              <a:t> </a:t>
             </a:r>
             <a:r>
               <a:rPr lang="bg-BG" sz="2400" b="1" dirty="0">
@@ -36511,7 +36647,18 @@
                   <a:schemeClr val="bg2"/>
                 </a:solidFill>
               </a:rPr>
-              <a:t>и го конвертира</a:t>
+              <a:t>и го </a:t>
+            </a:r>
+            <a:r>
+              <a:rPr lang="bg-BG" sz="2400" b="1" dirty="0">
+                <a:solidFill>
+                  <a:schemeClr val="bg1">
+                    <a:lumMod val="60000"/>
+                    <a:lumOff val="40000"/>
+                  </a:schemeClr>
+                </a:solidFill>
+              </a:rPr>
+              <a:t>конвертира</a:t>
             </a:r>
           </a:p>
         </p:txBody>
@@ -36612,7 +36759,7 @@
                                         <p:tgtEl>
                                           <p:spTgt spid="7">
                                             <p:txEl>
-                                              <p:pRg st="3" end="3"/>
+                                              <p:pRg st="0" end="0"/>
                                             </p:txEl>
                                           </p:spTgt>
                                         </p:tgtEl>
@@ -36627,39 +36774,26 @@
                                   </p:childTnLst>
                                 </p:cTn>
                               </p:par>
+                            </p:childTnLst>
+                          </p:cTn>
+                        </p:par>
+                      </p:childTnLst>
+                    </p:cTn>
+                  </p:par>
+                  <p:par>
+                    <p:cTn id="7" fill="hold">
+                      <p:stCondLst>
+                        <p:cond delay="indefinite"/>
+                      </p:stCondLst>
+                      <p:childTnLst>
+                        <p:par>
+                          <p:cTn id="8" fill="hold">
+                            <p:stCondLst>
+                              <p:cond delay="0"/>
+                            </p:stCondLst>
+                            <p:childTnLst>
                               <p:par>
-                                <p:cTn id="7" presetID="1" presetClass="entr" presetSubtype="0" fill="hold" nodeType="withEffect">
-                                  <p:stCondLst>
-                                    <p:cond delay="0"/>
-                                  </p:stCondLst>
-                                  <p:childTnLst>
-                                    <p:set>
-                                      <p:cBhvr>
-                                        <p:cTn id="8" dur="1" fill="hold">
-                                          <p:stCondLst>
-                                            <p:cond delay="0"/>
-                                          </p:stCondLst>
-                                        </p:cTn>
-                                        <p:tgtEl>
-                                          <p:spTgt spid="7">
-                                            <p:txEl>
-                                              <p:pRg st="4" end="4"/>
-                                            </p:txEl>
-                                          </p:spTgt>
-                                        </p:tgtEl>
-                                        <p:attrNameLst>
-                                          <p:attrName>style.visibility</p:attrName>
-                                        </p:attrNameLst>
-                                      </p:cBhvr>
-                                      <p:to>
-                                        <p:strVal val="visible"/>
-                                      </p:to>
-                                    </p:set>
-                                  </p:childTnLst>
-                                </p:cTn>
-                              </p:par>
-                              <p:par>
-                                <p:cTn id="9" presetID="1" presetClass="entr" presetSubtype="0" fill="hold" nodeType="withEffect">
+                                <p:cTn id="9" presetID="1" presetClass="entr" presetSubtype="0" fill="hold" nodeType="clickEffect">
                                   <p:stCondLst>
                                     <p:cond delay="0"/>
                                   </p:stCondLst>
@@ -36674,7 +36808,7 @@
                                         <p:tgtEl>
                                           <p:spTgt spid="7">
                                             <p:txEl>
-                                              <p:pRg st="5" end="5"/>
+                                              <p:pRg st="1" end="1"/>
                                             </p:txEl>
                                           </p:spTgt>
                                         </p:tgtEl>
@@ -36705,7 +36839,7 @@
                                         <p:tgtEl>
                                           <p:spTgt spid="7">
                                             <p:txEl>
-                                              <p:pRg st="6" end="6"/>
+                                              <p:pRg st="2" end="2"/>
                                             </p:txEl>
                                           </p:spTgt>
                                         </p:tgtEl>
@@ -36739,7 +36873,7 @@
                             </p:stCondLst>
                             <p:childTnLst>
                               <p:par>
-                                <p:cTn id="15" presetID="1" presetClass="entr" presetSubtype="0" fill="hold" grpId="0" nodeType="clickEffect">
+                                <p:cTn id="15" presetID="1" presetClass="entr" presetSubtype="0" fill="hold" nodeType="clickEffect">
                                   <p:stCondLst>
                                     <p:cond delay="0"/>
                                   </p:stCondLst>
@@ -36747,6 +36881,148 @@
                                     <p:set>
                                       <p:cBhvr>
                                         <p:cTn id="16" dur="1" fill="hold">
+                                          <p:stCondLst>
+                                            <p:cond delay="0"/>
+                                          </p:stCondLst>
+                                        </p:cTn>
+                                        <p:tgtEl>
+                                          <p:spTgt spid="7">
+                                            <p:txEl>
+                                              <p:pRg st="3" end="3"/>
+                                            </p:txEl>
+                                          </p:spTgt>
+                                        </p:tgtEl>
+                                        <p:attrNameLst>
+                                          <p:attrName>style.visibility</p:attrName>
+                                        </p:attrNameLst>
+                                      </p:cBhvr>
+                                      <p:to>
+                                        <p:strVal val="visible"/>
+                                      </p:to>
+                                    </p:set>
+                                  </p:childTnLst>
+                                </p:cTn>
+                              </p:par>
+                              <p:par>
+                                <p:cTn id="17" presetID="1" presetClass="entr" presetSubtype="0" fill="hold" nodeType="withEffect">
+                                  <p:stCondLst>
+                                    <p:cond delay="0"/>
+                                  </p:stCondLst>
+                                  <p:childTnLst>
+                                    <p:set>
+                                      <p:cBhvr>
+                                        <p:cTn id="18" dur="1" fill="hold">
+                                          <p:stCondLst>
+                                            <p:cond delay="0"/>
+                                          </p:stCondLst>
+                                        </p:cTn>
+                                        <p:tgtEl>
+                                          <p:spTgt spid="7">
+                                            <p:txEl>
+                                              <p:pRg st="4" end="4"/>
+                                            </p:txEl>
+                                          </p:spTgt>
+                                        </p:tgtEl>
+                                        <p:attrNameLst>
+                                          <p:attrName>style.visibility</p:attrName>
+                                        </p:attrNameLst>
+                                      </p:cBhvr>
+                                      <p:to>
+                                        <p:strVal val="visible"/>
+                                      </p:to>
+                                    </p:set>
+                                  </p:childTnLst>
+                                </p:cTn>
+                              </p:par>
+                              <p:par>
+                                <p:cTn id="19" presetID="1" presetClass="entr" presetSubtype="0" fill="hold" nodeType="withEffect">
+                                  <p:stCondLst>
+                                    <p:cond delay="0"/>
+                                  </p:stCondLst>
+                                  <p:childTnLst>
+                                    <p:set>
+                                      <p:cBhvr>
+                                        <p:cTn id="20" dur="1" fill="hold">
+                                          <p:stCondLst>
+                                            <p:cond delay="0"/>
+                                          </p:stCondLst>
+                                        </p:cTn>
+                                        <p:tgtEl>
+                                          <p:spTgt spid="7">
+                                            <p:txEl>
+                                              <p:pRg st="5" end="5"/>
+                                            </p:txEl>
+                                          </p:spTgt>
+                                        </p:tgtEl>
+                                        <p:attrNameLst>
+                                          <p:attrName>style.visibility</p:attrName>
+                                        </p:attrNameLst>
+                                      </p:cBhvr>
+                                      <p:to>
+                                        <p:strVal val="visible"/>
+                                      </p:to>
+                                    </p:set>
+                                  </p:childTnLst>
+                                </p:cTn>
+                              </p:par>
+                              <p:par>
+                                <p:cTn id="21" presetID="1" presetClass="entr" presetSubtype="0" fill="hold" nodeType="withEffect">
+                                  <p:stCondLst>
+                                    <p:cond delay="0"/>
+                                  </p:stCondLst>
+                                  <p:childTnLst>
+                                    <p:set>
+                                      <p:cBhvr>
+                                        <p:cTn id="22" dur="1" fill="hold">
+                                          <p:stCondLst>
+                                            <p:cond delay="0"/>
+                                          </p:stCondLst>
+                                        </p:cTn>
+                                        <p:tgtEl>
+                                          <p:spTgt spid="7">
+                                            <p:txEl>
+                                              <p:pRg st="6" end="6"/>
+                                            </p:txEl>
+                                          </p:spTgt>
+                                        </p:tgtEl>
+                                        <p:attrNameLst>
+                                          <p:attrName>style.visibility</p:attrName>
+                                        </p:attrNameLst>
+                                      </p:cBhvr>
+                                      <p:to>
+                                        <p:strVal val="visible"/>
+                                      </p:to>
+                                    </p:set>
+                                  </p:childTnLst>
+                                </p:cTn>
+                              </p:par>
+                            </p:childTnLst>
+                          </p:cTn>
+                        </p:par>
+                      </p:childTnLst>
+                    </p:cTn>
+                  </p:par>
+                  <p:par>
+                    <p:cTn id="23" fill="hold">
+                      <p:stCondLst>
+                        <p:cond delay="indefinite"/>
+                      </p:stCondLst>
+                      <p:childTnLst>
+                        <p:par>
+                          <p:cTn id="24" fill="hold">
+                            <p:stCondLst>
+                              <p:cond delay="0"/>
+                            </p:stCondLst>
+                            <p:childTnLst>
+                              <p:par>
+                                <p:cTn id="25" presetID="1" presetClass="entr" presetSubtype="0" fill="hold" grpId="0" nodeType="clickEffect">
+                                  <p:stCondLst>
+                                    <p:cond delay="0"/>
+                                  </p:stCondLst>
+                                  <p:childTnLst>
+                                    <p:set>
+                                      <p:cBhvr>
+                                        <p:cTn id="26" dur="1" fill="hold">
                                           <p:stCondLst>
                                             <p:cond delay="0"/>
                                           </p:stCondLst>
@@ -36772,26 +37048,26 @@
                     </p:cTn>
                   </p:par>
                   <p:par>
-                    <p:cTn id="17" fill="hold">
+                    <p:cTn id="27" fill="hold">
                       <p:stCondLst>
                         <p:cond delay="indefinite"/>
                       </p:stCondLst>
                       <p:childTnLst>
                         <p:par>
-                          <p:cTn id="18" fill="hold">
+                          <p:cTn id="28" fill="hold">
                             <p:stCondLst>
                               <p:cond delay="0"/>
                             </p:stCondLst>
                             <p:childTnLst>
                               <p:par>
-                                <p:cTn id="19" presetID="1" presetClass="entr" presetSubtype="0" fill="hold" grpId="0" nodeType="clickEffect">
+                                <p:cTn id="29" presetID="1" presetClass="entr" presetSubtype="0" fill="hold" grpId="0" nodeType="clickEffect">
                                   <p:stCondLst>
                                     <p:cond delay="0"/>
                                   </p:stCondLst>
                                   <p:childTnLst>
                                     <p:set>
                                       <p:cBhvr>
-                                        <p:cTn id="20" dur="1" fill="hold">
+                                        <p:cTn id="30" dur="1" fill="hold">
                                           <p:stCondLst>
                                             <p:cond delay="0"/>
                                           </p:stCondLst>

</xml_diff>

<commit_message>
Uploaded correct slides for "13. Polymorphism"
</commit_message>
<xml_diff>
--- a/Courses/Software-Sciences/Module-1-OOP-New/13-Polymorphism/13-Polymorphism.pptx
+++ b/Courses/Software-Sciences/Module-1-OOP-New/13-Polymorphism/13-Polymorphism.pptx
@@ -327,7 +327,7 @@
           <a:p>
             <a:fld id="{4E087215-0C8F-4762-A664-737A353EC9A4}" type="datetimeFigureOut">
               <a:rPr lang="bg-BG" smtClean="0"/>
-              <a:t>17.1.2023 г.</a:t>
+              <a:t>18.01.23 г.</a:t>
             </a:fld>
             <a:endParaRPr lang="bg-BG"/>
           </a:p>
@@ -518,7 +518,7 @@
           <a:p>
             <a:fld id="{72D84649-876A-46C9-8472-14CB09C070D8}" type="datetimeFigureOut">
               <a:rPr lang="en-US" smtClean="0"/>
-              <a:t>17-Jan-23</a:t>
+              <a:t>1/18/23</a:t>
             </a:fld>
             <a:endParaRPr lang="en-US"/>
           </a:p>

</xml_diff>